<commit_message>
Modificación de componentes e indicadores
</commit_message>
<xml_diff>
--- a/esquemas/Planta_ECARM.pptx
+++ b/esquemas/Planta_ECARM.pptx
@@ -2,18 +2,18 @@
 <file path=ppt/presentation.xml><?xml version="1.0" encoding="utf-8"?>
 <p:presentation xmlns:a="http://schemas.openxmlformats.org/drawingml/2006/main" xmlns:r="http://schemas.openxmlformats.org/officeDocument/2006/relationships" xmlns:p="http://schemas.openxmlformats.org/presentationml/2006/main" saveSubsetFonts="1">
   <p:sldMasterIdLst>
-    <p:sldMasterId id="2147483648" r:id="rId1"/>
+    <p:sldMasterId id="2147483684" r:id="rId1"/>
   </p:sldMasterIdLst>
   <p:sldIdLst>
     <p:sldId id="256" r:id="rId2"/>
   </p:sldIdLst>
-  <p:sldSz cx="12192000" cy="6858000"/>
+  <p:sldSz cx="9906000" cy="6858000" type="A4"/>
   <p:notesSz cx="6858000" cy="9144000"/>
   <p:defaultTextStyle>
     <a:defPPr>
-      <a:defRPr lang="es-ES"/>
+      <a:defRPr lang="en-US"/>
     </a:defPPr>
-    <a:lvl1pPr marL="0" algn="l" defTabSz="914400" rtl="0" eaLnBrk="1" latinLnBrk="0" hangingPunct="1">
+    <a:lvl1pPr marL="0" algn="l" defTabSz="457200" rtl="0" eaLnBrk="1" latinLnBrk="0" hangingPunct="1">
       <a:defRPr sz="1800" kern="1200">
         <a:solidFill>
           <a:schemeClr val="tx1"/>
@@ -23,7 +23,7 @@
         <a:cs typeface="+mn-cs"/>
       </a:defRPr>
     </a:lvl1pPr>
-    <a:lvl2pPr marL="457200" algn="l" defTabSz="914400" rtl="0" eaLnBrk="1" latinLnBrk="0" hangingPunct="1">
+    <a:lvl2pPr marL="457200" algn="l" defTabSz="457200" rtl="0" eaLnBrk="1" latinLnBrk="0" hangingPunct="1">
       <a:defRPr sz="1800" kern="1200">
         <a:solidFill>
           <a:schemeClr val="tx1"/>
@@ -33,7 +33,7 @@
         <a:cs typeface="+mn-cs"/>
       </a:defRPr>
     </a:lvl2pPr>
-    <a:lvl3pPr marL="914400" algn="l" defTabSz="914400" rtl="0" eaLnBrk="1" latinLnBrk="0" hangingPunct="1">
+    <a:lvl3pPr marL="914400" algn="l" defTabSz="457200" rtl="0" eaLnBrk="1" latinLnBrk="0" hangingPunct="1">
       <a:defRPr sz="1800" kern="1200">
         <a:solidFill>
           <a:schemeClr val="tx1"/>
@@ -43,7 +43,7 @@
         <a:cs typeface="+mn-cs"/>
       </a:defRPr>
     </a:lvl3pPr>
-    <a:lvl4pPr marL="1371600" algn="l" defTabSz="914400" rtl="0" eaLnBrk="1" latinLnBrk="0" hangingPunct="1">
+    <a:lvl4pPr marL="1371600" algn="l" defTabSz="457200" rtl="0" eaLnBrk="1" latinLnBrk="0" hangingPunct="1">
       <a:defRPr sz="1800" kern="1200">
         <a:solidFill>
           <a:schemeClr val="tx1"/>
@@ -53,7 +53,7 @@
         <a:cs typeface="+mn-cs"/>
       </a:defRPr>
     </a:lvl4pPr>
-    <a:lvl5pPr marL="1828800" algn="l" defTabSz="914400" rtl="0" eaLnBrk="1" latinLnBrk="0" hangingPunct="1">
+    <a:lvl5pPr marL="1828800" algn="l" defTabSz="457200" rtl="0" eaLnBrk="1" latinLnBrk="0" hangingPunct="1">
       <a:defRPr sz="1800" kern="1200">
         <a:solidFill>
           <a:schemeClr val="tx1"/>
@@ -63,7 +63,7 @@
         <a:cs typeface="+mn-cs"/>
       </a:defRPr>
     </a:lvl5pPr>
-    <a:lvl6pPr marL="2286000" algn="l" defTabSz="914400" rtl="0" eaLnBrk="1" latinLnBrk="0" hangingPunct="1">
+    <a:lvl6pPr marL="2286000" algn="l" defTabSz="457200" rtl="0" eaLnBrk="1" latinLnBrk="0" hangingPunct="1">
       <a:defRPr sz="1800" kern="1200">
         <a:solidFill>
           <a:schemeClr val="tx1"/>
@@ -73,7 +73,7 @@
         <a:cs typeface="+mn-cs"/>
       </a:defRPr>
     </a:lvl6pPr>
-    <a:lvl7pPr marL="2743200" algn="l" defTabSz="914400" rtl="0" eaLnBrk="1" latinLnBrk="0" hangingPunct="1">
+    <a:lvl7pPr marL="2743200" algn="l" defTabSz="457200" rtl="0" eaLnBrk="1" latinLnBrk="0" hangingPunct="1">
       <a:defRPr sz="1800" kern="1200">
         <a:solidFill>
           <a:schemeClr val="tx1"/>
@@ -83,7 +83,7 @@
         <a:cs typeface="+mn-cs"/>
       </a:defRPr>
     </a:lvl7pPr>
-    <a:lvl8pPr marL="3200400" algn="l" defTabSz="914400" rtl="0" eaLnBrk="1" latinLnBrk="0" hangingPunct="1">
+    <a:lvl8pPr marL="3200400" algn="l" defTabSz="457200" rtl="0" eaLnBrk="1" latinLnBrk="0" hangingPunct="1">
       <a:defRPr sz="1800" kern="1200">
         <a:solidFill>
           <a:schemeClr val="tx1"/>
@@ -93,7 +93,7 @@
         <a:cs typeface="+mn-cs"/>
       </a:defRPr>
     </a:lvl8pPr>
-    <a:lvl9pPr marL="3657600" algn="l" defTabSz="914400" rtl="0" eaLnBrk="1" latinLnBrk="0" hangingPunct="1">
+    <a:lvl9pPr marL="3657600" algn="l" defTabSz="457200" rtl="0" eaLnBrk="1" latinLnBrk="0" hangingPunct="1">
       <a:defRPr sz="1800" kern="1200">
         <a:solidFill>
           <a:schemeClr val="tx1"/>
@@ -110,10 +110,6 @@
     </p:ext>
   </p:extLst>
 </p:presentation>
-</file>
-
-<file path=ppt/revisionInfo.xml><?xml version="1.0" encoding="utf-8"?>
-<p1510:revInfo xmlns:a="http://schemas.openxmlformats.org/drawingml/2006/main" xmlns:r="http://schemas.openxmlformats.org/officeDocument/2006/relationships" xmlns:p1510="http://schemas.microsoft.com/office/powerpoint/2015/10/main"/>
 </file>
 
 <file path=ppt/slideLayouts/slideLayout1.xml><?xml version="1.0" encoding="utf-8"?>
@@ -135,13 +131,7 @@
       </p:grpSpPr>
       <p:sp>
         <p:nvSpPr>
-          <p:cNvPr id="2" name="Título 1">
-            <a:extLst>
-              <a:ext uri="{FF2B5EF4-FFF2-40B4-BE49-F238E27FC236}">
-                <a16:creationId xmlns:a16="http://schemas.microsoft.com/office/drawing/2014/main" id="{AC5F5BC4-4B70-4DA0-887E-6688BFD0C9E2}"/>
-              </a:ext>
-            </a:extLst>
-          </p:cNvPr>
+          <p:cNvPr id="2" name="Title 1"/>
           <p:cNvSpPr>
             <a:spLocks noGrp="1"/>
           </p:cNvSpPr>
@@ -151,8 +141,8 @@
         </p:nvSpPr>
         <p:spPr>
           <a:xfrm>
-            <a:off x="1524000" y="1122363"/>
-            <a:ext cx="9144000" cy="2387600"/>
+            <a:off x="742950" y="1122363"/>
+            <a:ext cx="8420100" cy="2387600"/>
           </a:xfrm>
         </p:spPr>
         <p:txBody>
@@ -167,18 +157,13 @@
               <a:rPr lang="es-ES"/>
               <a:t>Haga clic para modificar el estilo de título del patrón</a:t>
             </a:r>
-          </a:p>
-        </p:txBody>
-      </p:sp>
-      <p:sp>
-        <p:nvSpPr>
-          <p:cNvPr id="3" name="Subtítulo 2">
-            <a:extLst>
-              <a:ext uri="{FF2B5EF4-FFF2-40B4-BE49-F238E27FC236}">
-                <a16:creationId xmlns:a16="http://schemas.microsoft.com/office/drawing/2014/main" id="{CB10AE50-63C8-4B81-917D-638EEBF74466}"/>
-              </a:ext>
-            </a:extLst>
-          </p:cNvPr>
+            <a:endParaRPr lang="en-US" dirty="0"/>
+          </a:p>
+        </p:txBody>
+      </p:sp>
+      <p:sp>
+        <p:nvSpPr>
+          <p:cNvPr id="3" name="Subtitle 2"/>
           <p:cNvSpPr>
             <a:spLocks noGrp="1"/>
           </p:cNvSpPr>
@@ -188,8 +173,8 @@
         </p:nvSpPr>
         <p:spPr>
           <a:xfrm>
-            <a:off x="1524000" y="3602038"/>
-            <a:ext cx="9144000" cy="1655762"/>
+            <a:off x="1238250" y="3602038"/>
+            <a:ext cx="7429500" cy="1655762"/>
           </a:xfrm>
         </p:spPr>
         <p:txBody>
@@ -237,18 +222,13 @@
               <a:rPr lang="es-ES"/>
               <a:t>Haga clic para modificar el estilo de subtítulo del patrón</a:t>
             </a:r>
-          </a:p>
-        </p:txBody>
-      </p:sp>
-      <p:sp>
-        <p:nvSpPr>
-          <p:cNvPr id="4" name="Marcador de fecha 3">
-            <a:extLst>
-              <a:ext uri="{FF2B5EF4-FFF2-40B4-BE49-F238E27FC236}">
-                <a16:creationId xmlns:a16="http://schemas.microsoft.com/office/drawing/2014/main" id="{046B0702-D740-4832-B2FA-60B38883CB66}"/>
-              </a:ext>
-            </a:extLst>
-          </p:cNvPr>
+            <a:endParaRPr lang="en-US" dirty="0"/>
+          </a:p>
+        </p:txBody>
+      </p:sp>
+      <p:sp>
+        <p:nvSpPr>
+          <p:cNvPr id="4" name="Date Placeholder 3"/>
           <p:cNvSpPr>
             <a:spLocks noGrp="1"/>
           </p:cNvSpPr>
@@ -263,7 +243,7 @@
           <a:p>
             <a:fld id="{F934F427-73AC-4E1C-B145-1BB7D3FBF73B}" type="datetimeFigureOut">
               <a:rPr lang="es-ES" smtClean="0"/>
-              <a:t>09/01/2018</a:t>
+              <a:t>11/01/2018</a:t>
             </a:fld>
             <a:endParaRPr lang="es-ES"/>
           </a:p>
@@ -271,13 +251,7 @@
       </p:sp>
       <p:sp>
         <p:nvSpPr>
-          <p:cNvPr id="5" name="Marcador de pie de página 4">
-            <a:extLst>
-              <a:ext uri="{FF2B5EF4-FFF2-40B4-BE49-F238E27FC236}">
-                <a16:creationId xmlns:a16="http://schemas.microsoft.com/office/drawing/2014/main" id="{1A4528B1-76ED-4349-B78F-97A9596315AF}"/>
-              </a:ext>
-            </a:extLst>
-          </p:cNvPr>
+          <p:cNvPr id="5" name="Footer Placeholder 4"/>
           <p:cNvSpPr>
             <a:spLocks noGrp="1"/>
           </p:cNvSpPr>
@@ -296,13 +270,7 @@
       </p:sp>
       <p:sp>
         <p:nvSpPr>
-          <p:cNvPr id="6" name="Marcador de número de diapositiva 5">
-            <a:extLst>
-              <a:ext uri="{FF2B5EF4-FFF2-40B4-BE49-F238E27FC236}">
-                <a16:creationId xmlns:a16="http://schemas.microsoft.com/office/drawing/2014/main" id="{7E09C057-A14E-4872-9CEC-367ECAFFCFC0}"/>
-              </a:ext>
-            </a:extLst>
-          </p:cNvPr>
+          <p:cNvPr id="6" name="Slide Number Placeholder 5"/>
           <p:cNvSpPr>
             <a:spLocks noGrp="1"/>
           </p:cNvSpPr>
@@ -326,7 +294,7 @@
     </p:spTree>
     <p:extLst>
       <p:ext uri="{BB962C8B-B14F-4D97-AF65-F5344CB8AC3E}">
-        <p14:creationId xmlns:p14="http://schemas.microsoft.com/office/powerpoint/2010/main" val="1459295915"/>
+        <p14:creationId xmlns:p14="http://schemas.microsoft.com/office/powerpoint/2010/main" val="2408936753"/>
       </p:ext>
     </p:extLst>
   </p:cSld>
@@ -355,13 +323,7 @@
       </p:grpSpPr>
       <p:sp>
         <p:nvSpPr>
-          <p:cNvPr id="2" name="Título 1">
-            <a:extLst>
-              <a:ext uri="{FF2B5EF4-FFF2-40B4-BE49-F238E27FC236}">
-                <a16:creationId xmlns:a16="http://schemas.microsoft.com/office/drawing/2014/main" id="{4D7D20ED-B2FB-4B27-A1FD-64444BD2060F}"/>
-              </a:ext>
-            </a:extLst>
-          </p:cNvPr>
+          <p:cNvPr id="2" name="Title 1"/>
           <p:cNvSpPr>
             <a:spLocks noGrp="1"/>
           </p:cNvSpPr>
@@ -378,18 +340,13 @@
               <a:rPr lang="es-ES"/>
               <a:t>Haga clic para modificar el estilo de título del patrón</a:t>
             </a:r>
-          </a:p>
-        </p:txBody>
-      </p:sp>
-      <p:sp>
-        <p:nvSpPr>
-          <p:cNvPr id="3" name="Marcador de texto vertical 2">
-            <a:extLst>
-              <a:ext uri="{FF2B5EF4-FFF2-40B4-BE49-F238E27FC236}">
-                <a16:creationId xmlns:a16="http://schemas.microsoft.com/office/drawing/2014/main" id="{97C1CC03-90B9-4BA0-A537-CA56CA6CD6C5}"/>
-              </a:ext>
-            </a:extLst>
-          </p:cNvPr>
+            <a:endParaRPr lang="en-US" dirty="0"/>
+          </a:p>
+        </p:txBody>
+      </p:sp>
+      <p:sp>
+        <p:nvSpPr>
+          <p:cNvPr id="3" name="Vertical Text Placeholder 2"/>
           <p:cNvSpPr>
             <a:spLocks noGrp="1"/>
           </p:cNvSpPr>
@@ -435,18 +392,13 @@
               <a:rPr lang="es-ES"/>
               <a:t>Quinto nivel</a:t>
             </a:r>
-          </a:p>
-        </p:txBody>
-      </p:sp>
-      <p:sp>
-        <p:nvSpPr>
-          <p:cNvPr id="4" name="Marcador de fecha 3">
-            <a:extLst>
-              <a:ext uri="{FF2B5EF4-FFF2-40B4-BE49-F238E27FC236}">
-                <a16:creationId xmlns:a16="http://schemas.microsoft.com/office/drawing/2014/main" id="{33E6B786-173F-4140-8539-B68B56DE6587}"/>
-              </a:ext>
-            </a:extLst>
-          </p:cNvPr>
+            <a:endParaRPr lang="en-US" dirty="0"/>
+          </a:p>
+        </p:txBody>
+      </p:sp>
+      <p:sp>
+        <p:nvSpPr>
+          <p:cNvPr id="4" name="Date Placeholder 3"/>
           <p:cNvSpPr>
             <a:spLocks noGrp="1"/>
           </p:cNvSpPr>
@@ -461,7 +413,7 @@
           <a:p>
             <a:fld id="{F934F427-73AC-4E1C-B145-1BB7D3FBF73B}" type="datetimeFigureOut">
               <a:rPr lang="es-ES" smtClean="0"/>
-              <a:t>09/01/2018</a:t>
+              <a:t>11/01/2018</a:t>
             </a:fld>
             <a:endParaRPr lang="es-ES"/>
           </a:p>
@@ -469,13 +421,7 @@
       </p:sp>
       <p:sp>
         <p:nvSpPr>
-          <p:cNvPr id="5" name="Marcador de pie de página 4">
-            <a:extLst>
-              <a:ext uri="{FF2B5EF4-FFF2-40B4-BE49-F238E27FC236}">
-                <a16:creationId xmlns:a16="http://schemas.microsoft.com/office/drawing/2014/main" id="{A0FD0F11-843F-4E36-AF8A-6A18A552576F}"/>
-              </a:ext>
-            </a:extLst>
-          </p:cNvPr>
+          <p:cNvPr id="5" name="Footer Placeholder 4"/>
           <p:cNvSpPr>
             <a:spLocks noGrp="1"/>
           </p:cNvSpPr>
@@ -494,13 +440,7 @@
       </p:sp>
       <p:sp>
         <p:nvSpPr>
-          <p:cNvPr id="6" name="Marcador de número de diapositiva 5">
-            <a:extLst>
-              <a:ext uri="{FF2B5EF4-FFF2-40B4-BE49-F238E27FC236}">
-                <a16:creationId xmlns:a16="http://schemas.microsoft.com/office/drawing/2014/main" id="{43F7AE1B-7EA9-467C-A53F-5CE23A0F272C}"/>
-              </a:ext>
-            </a:extLst>
-          </p:cNvPr>
+          <p:cNvPr id="6" name="Slide Number Placeholder 5"/>
           <p:cNvSpPr>
             <a:spLocks noGrp="1"/>
           </p:cNvSpPr>
@@ -524,7 +464,7 @@
     </p:spTree>
     <p:extLst>
       <p:ext uri="{BB962C8B-B14F-4D97-AF65-F5344CB8AC3E}">
-        <p14:creationId xmlns:p14="http://schemas.microsoft.com/office/powerpoint/2010/main" val="3321772723"/>
+        <p14:creationId xmlns:p14="http://schemas.microsoft.com/office/powerpoint/2010/main" val="1677316036"/>
       </p:ext>
     </p:extLst>
   </p:cSld>
@@ -553,13 +493,7 @@
       </p:grpSpPr>
       <p:sp>
         <p:nvSpPr>
-          <p:cNvPr id="2" name="Título vertical 1">
-            <a:extLst>
-              <a:ext uri="{FF2B5EF4-FFF2-40B4-BE49-F238E27FC236}">
-                <a16:creationId xmlns:a16="http://schemas.microsoft.com/office/drawing/2014/main" id="{D412C484-B175-414D-8FD9-ED7450ABDD1E}"/>
-              </a:ext>
-            </a:extLst>
-          </p:cNvPr>
+          <p:cNvPr id="2" name="Vertical Title 1"/>
           <p:cNvSpPr>
             <a:spLocks noGrp="1"/>
           </p:cNvSpPr>
@@ -569,8 +503,8 @@
         </p:nvSpPr>
         <p:spPr>
           <a:xfrm>
-            <a:off x="8724900" y="365125"/>
-            <a:ext cx="2628900" cy="5811838"/>
+            <a:off x="7088982" y="365125"/>
+            <a:ext cx="2135981" cy="5811838"/>
           </a:xfrm>
         </p:spPr>
         <p:txBody>
@@ -581,18 +515,13 @@
               <a:rPr lang="es-ES"/>
               <a:t>Haga clic para modificar el estilo de título del patrón</a:t>
             </a:r>
-          </a:p>
-        </p:txBody>
-      </p:sp>
-      <p:sp>
-        <p:nvSpPr>
-          <p:cNvPr id="3" name="Marcador de texto vertical 2">
-            <a:extLst>
-              <a:ext uri="{FF2B5EF4-FFF2-40B4-BE49-F238E27FC236}">
-                <a16:creationId xmlns:a16="http://schemas.microsoft.com/office/drawing/2014/main" id="{7240970B-AE00-4E27-AD41-9B83ECAECED4}"/>
-              </a:ext>
-            </a:extLst>
-          </p:cNvPr>
+            <a:endParaRPr lang="en-US" dirty="0"/>
+          </a:p>
+        </p:txBody>
+      </p:sp>
+      <p:sp>
+        <p:nvSpPr>
+          <p:cNvPr id="3" name="Vertical Text Placeholder 2"/>
           <p:cNvSpPr>
             <a:spLocks noGrp="1"/>
           </p:cNvSpPr>
@@ -602,8 +531,8 @@
         </p:nvSpPr>
         <p:spPr>
           <a:xfrm>
-            <a:off x="838200" y="365125"/>
-            <a:ext cx="7734300" cy="5811838"/>
+            <a:off x="681038" y="365125"/>
+            <a:ext cx="6284119" cy="5811838"/>
           </a:xfrm>
         </p:spPr>
         <p:txBody>
@@ -643,18 +572,13 @@
               <a:rPr lang="es-ES"/>
               <a:t>Quinto nivel</a:t>
             </a:r>
-          </a:p>
-        </p:txBody>
-      </p:sp>
-      <p:sp>
-        <p:nvSpPr>
-          <p:cNvPr id="4" name="Marcador de fecha 3">
-            <a:extLst>
-              <a:ext uri="{FF2B5EF4-FFF2-40B4-BE49-F238E27FC236}">
-                <a16:creationId xmlns:a16="http://schemas.microsoft.com/office/drawing/2014/main" id="{B34082F6-6059-404C-9A4D-AE71B990B644}"/>
-              </a:ext>
-            </a:extLst>
-          </p:cNvPr>
+            <a:endParaRPr lang="en-US" dirty="0"/>
+          </a:p>
+        </p:txBody>
+      </p:sp>
+      <p:sp>
+        <p:nvSpPr>
+          <p:cNvPr id="4" name="Date Placeholder 3"/>
           <p:cNvSpPr>
             <a:spLocks noGrp="1"/>
           </p:cNvSpPr>
@@ -669,7 +593,7 @@
           <a:p>
             <a:fld id="{F934F427-73AC-4E1C-B145-1BB7D3FBF73B}" type="datetimeFigureOut">
               <a:rPr lang="es-ES" smtClean="0"/>
-              <a:t>09/01/2018</a:t>
+              <a:t>11/01/2018</a:t>
             </a:fld>
             <a:endParaRPr lang="es-ES"/>
           </a:p>
@@ -677,13 +601,7 @@
       </p:sp>
       <p:sp>
         <p:nvSpPr>
-          <p:cNvPr id="5" name="Marcador de pie de página 4">
-            <a:extLst>
-              <a:ext uri="{FF2B5EF4-FFF2-40B4-BE49-F238E27FC236}">
-                <a16:creationId xmlns:a16="http://schemas.microsoft.com/office/drawing/2014/main" id="{8C42F0DD-E871-409F-B921-E43431939466}"/>
-              </a:ext>
-            </a:extLst>
-          </p:cNvPr>
+          <p:cNvPr id="5" name="Footer Placeholder 4"/>
           <p:cNvSpPr>
             <a:spLocks noGrp="1"/>
           </p:cNvSpPr>
@@ -702,13 +620,7 @@
       </p:sp>
       <p:sp>
         <p:nvSpPr>
-          <p:cNvPr id="6" name="Marcador de número de diapositiva 5">
-            <a:extLst>
-              <a:ext uri="{FF2B5EF4-FFF2-40B4-BE49-F238E27FC236}">
-                <a16:creationId xmlns:a16="http://schemas.microsoft.com/office/drawing/2014/main" id="{927C76C5-7BB9-4B32-B9C9-1E7E2195D4D5}"/>
-              </a:ext>
-            </a:extLst>
-          </p:cNvPr>
+          <p:cNvPr id="6" name="Slide Number Placeholder 5"/>
           <p:cNvSpPr>
             <a:spLocks noGrp="1"/>
           </p:cNvSpPr>
@@ -732,7 +644,7 @@
     </p:spTree>
     <p:extLst>
       <p:ext uri="{BB962C8B-B14F-4D97-AF65-F5344CB8AC3E}">
-        <p14:creationId xmlns:p14="http://schemas.microsoft.com/office/powerpoint/2010/main" val="328582525"/>
+        <p14:creationId xmlns:p14="http://schemas.microsoft.com/office/powerpoint/2010/main" val="601647482"/>
       </p:ext>
     </p:extLst>
   </p:cSld>
@@ -761,13 +673,7 @@
       </p:grpSpPr>
       <p:sp>
         <p:nvSpPr>
-          <p:cNvPr id="2" name="Título 1">
-            <a:extLst>
-              <a:ext uri="{FF2B5EF4-FFF2-40B4-BE49-F238E27FC236}">
-                <a16:creationId xmlns:a16="http://schemas.microsoft.com/office/drawing/2014/main" id="{C909B8B2-8CD2-41A0-BA88-CFB13B178521}"/>
-              </a:ext>
-            </a:extLst>
-          </p:cNvPr>
+          <p:cNvPr id="2" name="Title 1"/>
           <p:cNvSpPr>
             <a:spLocks noGrp="1"/>
           </p:cNvSpPr>
@@ -784,18 +690,13 @@
               <a:rPr lang="es-ES"/>
               <a:t>Haga clic para modificar el estilo de título del patrón</a:t>
             </a:r>
-          </a:p>
-        </p:txBody>
-      </p:sp>
-      <p:sp>
-        <p:nvSpPr>
-          <p:cNvPr id="3" name="Marcador de contenido 2">
-            <a:extLst>
-              <a:ext uri="{FF2B5EF4-FFF2-40B4-BE49-F238E27FC236}">
-                <a16:creationId xmlns:a16="http://schemas.microsoft.com/office/drawing/2014/main" id="{91F6FC0F-5C16-4A1F-A340-FEF304FD3598}"/>
-              </a:ext>
-            </a:extLst>
-          </p:cNvPr>
+            <a:endParaRPr lang="en-US" dirty="0"/>
+          </a:p>
+        </p:txBody>
+      </p:sp>
+      <p:sp>
+        <p:nvSpPr>
+          <p:cNvPr id="3" name="Content Placeholder 2"/>
           <p:cNvSpPr>
             <a:spLocks noGrp="1"/>
           </p:cNvSpPr>
@@ -841,18 +742,13 @@
               <a:rPr lang="es-ES"/>
               <a:t>Quinto nivel</a:t>
             </a:r>
-          </a:p>
-        </p:txBody>
-      </p:sp>
-      <p:sp>
-        <p:nvSpPr>
-          <p:cNvPr id="4" name="Marcador de fecha 3">
-            <a:extLst>
-              <a:ext uri="{FF2B5EF4-FFF2-40B4-BE49-F238E27FC236}">
-                <a16:creationId xmlns:a16="http://schemas.microsoft.com/office/drawing/2014/main" id="{47065891-C143-48E7-B85F-F44B738472E8}"/>
-              </a:ext>
-            </a:extLst>
-          </p:cNvPr>
+            <a:endParaRPr lang="en-US" dirty="0"/>
+          </a:p>
+        </p:txBody>
+      </p:sp>
+      <p:sp>
+        <p:nvSpPr>
+          <p:cNvPr id="4" name="Date Placeholder 3"/>
           <p:cNvSpPr>
             <a:spLocks noGrp="1"/>
           </p:cNvSpPr>
@@ -867,7 +763,7 @@
           <a:p>
             <a:fld id="{F934F427-73AC-4E1C-B145-1BB7D3FBF73B}" type="datetimeFigureOut">
               <a:rPr lang="es-ES" smtClean="0"/>
-              <a:t>09/01/2018</a:t>
+              <a:t>11/01/2018</a:t>
             </a:fld>
             <a:endParaRPr lang="es-ES"/>
           </a:p>
@@ -875,13 +771,7 @@
       </p:sp>
       <p:sp>
         <p:nvSpPr>
-          <p:cNvPr id="5" name="Marcador de pie de página 4">
-            <a:extLst>
-              <a:ext uri="{FF2B5EF4-FFF2-40B4-BE49-F238E27FC236}">
-                <a16:creationId xmlns:a16="http://schemas.microsoft.com/office/drawing/2014/main" id="{52B6529E-3548-492F-8C3D-79689C700B1A}"/>
-              </a:ext>
-            </a:extLst>
-          </p:cNvPr>
+          <p:cNvPr id="5" name="Footer Placeholder 4"/>
           <p:cNvSpPr>
             <a:spLocks noGrp="1"/>
           </p:cNvSpPr>
@@ -900,13 +790,7 @@
       </p:sp>
       <p:sp>
         <p:nvSpPr>
-          <p:cNvPr id="6" name="Marcador de número de diapositiva 5">
-            <a:extLst>
-              <a:ext uri="{FF2B5EF4-FFF2-40B4-BE49-F238E27FC236}">
-                <a16:creationId xmlns:a16="http://schemas.microsoft.com/office/drawing/2014/main" id="{047F9AA0-340D-43D3-8A33-2BDB311BFA3D}"/>
-              </a:ext>
-            </a:extLst>
-          </p:cNvPr>
+          <p:cNvPr id="6" name="Slide Number Placeholder 5"/>
           <p:cNvSpPr>
             <a:spLocks noGrp="1"/>
           </p:cNvSpPr>
@@ -930,7 +814,7 @@
     </p:spTree>
     <p:extLst>
       <p:ext uri="{BB962C8B-B14F-4D97-AF65-F5344CB8AC3E}">
-        <p14:creationId xmlns:p14="http://schemas.microsoft.com/office/powerpoint/2010/main" val="916241477"/>
+        <p14:creationId xmlns:p14="http://schemas.microsoft.com/office/powerpoint/2010/main" val="4160993827"/>
       </p:ext>
     </p:extLst>
   </p:cSld>
@@ -959,13 +843,7 @@
       </p:grpSpPr>
       <p:sp>
         <p:nvSpPr>
-          <p:cNvPr id="2" name="Título 1">
-            <a:extLst>
-              <a:ext uri="{FF2B5EF4-FFF2-40B4-BE49-F238E27FC236}">
-                <a16:creationId xmlns:a16="http://schemas.microsoft.com/office/drawing/2014/main" id="{6B032CED-E0C0-487F-9D89-CEB9DC71518D}"/>
-              </a:ext>
-            </a:extLst>
-          </p:cNvPr>
+          <p:cNvPr id="2" name="Title 1"/>
           <p:cNvSpPr>
             <a:spLocks noGrp="1"/>
           </p:cNvSpPr>
@@ -975,8 +853,8 @@
         </p:nvSpPr>
         <p:spPr>
           <a:xfrm>
-            <a:off x="831850" y="1709738"/>
-            <a:ext cx="10515600" cy="2852737"/>
+            <a:off x="675879" y="1709740"/>
+            <a:ext cx="8543925" cy="2852737"/>
           </a:xfrm>
         </p:spPr>
         <p:txBody>
@@ -991,18 +869,13 @@
               <a:rPr lang="es-ES"/>
               <a:t>Haga clic para modificar el estilo de título del patrón</a:t>
             </a:r>
-          </a:p>
-        </p:txBody>
-      </p:sp>
-      <p:sp>
-        <p:nvSpPr>
-          <p:cNvPr id="3" name="Marcador de texto 2">
-            <a:extLst>
-              <a:ext uri="{FF2B5EF4-FFF2-40B4-BE49-F238E27FC236}">
-                <a16:creationId xmlns:a16="http://schemas.microsoft.com/office/drawing/2014/main" id="{A8A638B2-FAA4-4CD4-A828-1CB924406FF5}"/>
-              </a:ext>
-            </a:extLst>
-          </p:cNvPr>
+            <a:endParaRPr lang="en-US" dirty="0"/>
+          </a:p>
+        </p:txBody>
+      </p:sp>
+      <p:sp>
+        <p:nvSpPr>
+          <p:cNvPr id="3" name="Text Placeholder 2"/>
           <p:cNvSpPr>
             <a:spLocks noGrp="1"/>
           </p:cNvSpPr>
@@ -1012,8 +885,8 @@
         </p:nvSpPr>
         <p:spPr>
           <a:xfrm>
-            <a:off x="831850" y="4589463"/>
-            <a:ext cx="10515600" cy="1500187"/>
+            <a:off x="675879" y="4589465"/>
+            <a:ext cx="8543925" cy="1500187"/>
           </a:xfrm>
         </p:spPr>
         <p:txBody>
@@ -1023,9 +896,7 @@
               <a:buNone/>
               <a:defRPr sz="2400">
                 <a:solidFill>
-                  <a:schemeClr val="tx1">
-                    <a:tint val="75000"/>
-                  </a:schemeClr>
+                  <a:schemeClr val="tx1"/>
                 </a:solidFill>
               </a:defRPr>
             </a:lvl1pPr>
@@ -1121,13 +992,7 @@
       </p:sp>
       <p:sp>
         <p:nvSpPr>
-          <p:cNvPr id="4" name="Marcador de fecha 3">
-            <a:extLst>
-              <a:ext uri="{FF2B5EF4-FFF2-40B4-BE49-F238E27FC236}">
-                <a16:creationId xmlns:a16="http://schemas.microsoft.com/office/drawing/2014/main" id="{743674E0-8971-430C-A613-F0E5A4FE8849}"/>
-              </a:ext>
-            </a:extLst>
-          </p:cNvPr>
+          <p:cNvPr id="4" name="Date Placeholder 3"/>
           <p:cNvSpPr>
             <a:spLocks noGrp="1"/>
           </p:cNvSpPr>
@@ -1142,7 +1007,7 @@
           <a:p>
             <a:fld id="{F934F427-73AC-4E1C-B145-1BB7D3FBF73B}" type="datetimeFigureOut">
               <a:rPr lang="es-ES" smtClean="0"/>
-              <a:t>09/01/2018</a:t>
+              <a:t>11/01/2018</a:t>
             </a:fld>
             <a:endParaRPr lang="es-ES"/>
           </a:p>
@@ -1150,13 +1015,7 @@
       </p:sp>
       <p:sp>
         <p:nvSpPr>
-          <p:cNvPr id="5" name="Marcador de pie de página 4">
-            <a:extLst>
-              <a:ext uri="{FF2B5EF4-FFF2-40B4-BE49-F238E27FC236}">
-                <a16:creationId xmlns:a16="http://schemas.microsoft.com/office/drawing/2014/main" id="{24C35CAB-0C3B-458E-BEC7-382C0EF508E6}"/>
-              </a:ext>
-            </a:extLst>
-          </p:cNvPr>
+          <p:cNvPr id="5" name="Footer Placeholder 4"/>
           <p:cNvSpPr>
             <a:spLocks noGrp="1"/>
           </p:cNvSpPr>
@@ -1175,13 +1034,7 @@
       </p:sp>
       <p:sp>
         <p:nvSpPr>
-          <p:cNvPr id="6" name="Marcador de número de diapositiva 5">
-            <a:extLst>
-              <a:ext uri="{FF2B5EF4-FFF2-40B4-BE49-F238E27FC236}">
-                <a16:creationId xmlns:a16="http://schemas.microsoft.com/office/drawing/2014/main" id="{404EC666-D2EE-4A29-86D9-10A5C52934E8}"/>
-              </a:ext>
-            </a:extLst>
-          </p:cNvPr>
+          <p:cNvPr id="6" name="Slide Number Placeholder 5"/>
           <p:cNvSpPr>
             <a:spLocks noGrp="1"/>
           </p:cNvSpPr>
@@ -1205,7 +1058,7 @@
     </p:spTree>
     <p:extLst>
       <p:ext uri="{BB962C8B-B14F-4D97-AF65-F5344CB8AC3E}">
-        <p14:creationId xmlns:p14="http://schemas.microsoft.com/office/powerpoint/2010/main" val="1573480525"/>
+        <p14:creationId xmlns:p14="http://schemas.microsoft.com/office/powerpoint/2010/main" val="1489025341"/>
       </p:ext>
     </p:extLst>
   </p:cSld>
@@ -1234,13 +1087,7 @@
       </p:grpSpPr>
       <p:sp>
         <p:nvSpPr>
-          <p:cNvPr id="2" name="Título 1">
-            <a:extLst>
-              <a:ext uri="{FF2B5EF4-FFF2-40B4-BE49-F238E27FC236}">
-                <a16:creationId xmlns:a16="http://schemas.microsoft.com/office/drawing/2014/main" id="{C9F04A1F-DA49-4102-A4A4-FEACE3A5B399}"/>
-              </a:ext>
-            </a:extLst>
-          </p:cNvPr>
+          <p:cNvPr id="2" name="Title 1"/>
           <p:cNvSpPr>
             <a:spLocks noGrp="1"/>
           </p:cNvSpPr>
@@ -1257,18 +1104,13 @@
               <a:rPr lang="es-ES"/>
               <a:t>Haga clic para modificar el estilo de título del patrón</a:t>
             </a:r>
-          </a:p>
-        </p:txBody>
-      </p:sp>
-      <p:sp>
-        <p:nvSpPr>
-          <p:cNvPr id="3" name="Marcador de contenido 2">
-            <a:extLst>
-              <a:ext uri="{FF2B5EF4-FFF2-40B4-BE49-F238E27FC236}">
-                <a16:creationId xmlns:a16="http://schemas.microsoft.com/office/drawing/2014/main" id="{CC641BE0-8AFA-4F75-BE84-8C9FC319A79E}"/>
-              </a:ext>
-            </a:extLst>
-          </p:cNvPr>
+            <a:endParaRPr lang="en-US" dirty="0"/>
+          </a:p>
+        </p:txBody>
+      </p:sp>
+      <p:sp>
+        <p:nvSpPr>
+          <p:cNvPr id="3" name="Content Placeholder 2"/>
           <p:cNvSpPr>
             <a:spLocks noGrp="1"/>
           </p:cNvSpPr>
@@ -1278,8 +1120,8 @@
         </p:nvSpPr>
         <p:spPr>
           <a:xfrm>
-            <a:off x="838200" y="1825625"/>
-            <a:ext cx="5181600" cy="4351338"/>
+            <a:off x="681038" y="1825625"/>
+            <a:ext cx="4210050" cy="4351338"/>
           </a:xfrm>
         </p:spPr>
         <p:txBody>
@@ -1319,18 +1161,13 @@
               <a:rPr lang="es-ES"/>
               <a:t>Quinto nivel</a:t>
             </a:r>
-          </a:p>
-        </p:txBody>
-      </p:sp>
-      <p:sp>
-        <p:nvSpPr>
-          <p:cNvPr id="4" name="Marcador de contenido 3">
-            <a:extLst>
-              <a:ext uri="{FF2B5EF4-FFF2-40B4-BE49-F238E27FC236}">
-                <a16:creationId xmlns:a16="http://schemas.microsoft.com/office/drawing/2014/main" id="{F634C5E2-5588-4DCC-B343-5009D6E658B9}"/>
-              </a:ext>
-            </a:extLst>
-          </p:cNvPr>
+            <a:endParaRPr lang="en-US" dirty="0"/>
+          </a:p>
+        </p:txBody>
+      </p:sp>
+      <p:sp>
+        <p:nvSpPr>
+          <p:cNvPr id="4" name="Content Placeholder 3"/>
           <p:cNvSpPr>
             <a:spLocks noGrp="1"/>
           </p:cNvSpPr>
@@ -1340,8 +1177,8 @@
         </p:nvSpPr>
         <p:spPr>
           <a:xfrm>
-            <a:off x="6172200" y="1825625"/>
-            <a:ext cx="5181600" cy="4351338"/>
+            <a:off x="5014913" y="1825625"/>
+            <a:ext cx="4210050" cy="4351338"/>
           </a:xfrm>
         </p:spPr>
         <p:txBody>
@@ -1381,18 +1218,13 @@
               <a:rPr lang="es-ES"/>
               <a:t>Quinto nivel</a:t>
             </a:r>
-          </a:p>
-        </p:txBody>
-      </p:sp>
-      <p:sp>
-        <p:nvSpPr>
-          <p:cNvPr id="5" name="Marcador de fecha 4">
-            <a:extLst>
-              <a:ext uri="{FF2B5EF4-FFF2-40B4-BE49-F238E27FC236}">
-                <a16:creationId xmlns:a16="http://schemas.microsoft.com/office/drawing/2014/main" id="{9A02C12F-D751-45E9-87D5-949E8EF321DB}"/>
-              </a:ext>
-            </a:extLst>
-          </p:cNvPr>
+            <a:endParaRPr lang="en-US" dirty="0"/>
+          </a:p>
+        </p:txBody>
+      </p:sp>
+      <p:sp>
+        <p:nvSpPr>
+          <p:cNvPr id="5" name="Date Placeholder 4"/>
           <p:cNvSpPr>
             <a:spLocks noGrp="1"/>
           </p:cNvSpPr>
@@ -1407,7 +1239,7 @@
           <a:p>
             <a:fld id="{F934F427-73AC-4E1C-B145-1BB7D3FBF73B}" type="datetimeFigureOut">
               <a:rPr lang="es-ES" smtClean="0"/>
-              <a:t>09/01/2018</a:t>
+              <a:t>11/01/2018</a:t>
             </a:fld>
             <a:endParaRPr lang="es-ES"/>
           </a:p>
@@ -1415,13 +1247,7 @@
       </p:sp>
       <p:sp>
         <p:nvSpPr>
-          <p:cNvPr id="6" name="Marcador de pie de página 5">
-            <a:extLst>
-              <a:ext uri="{FF2B5EF4-FFF2-40B4-BE49-F238E27FC236}">
-                <a16:creationId xmlns:a16="http://schemas.microsoft.com/office/drawing/2014/main" id="{EF9BE384-4C7B-4C69-A89C-99DC5110B7BC}"/>
-              </a:ext>
-            </a:extLst>
-          </p:cNvPr>
+          <p:cNvPr id="6" name="Footer Placeholder 5"/>
           <p:cNvSpPr>
             <a:spLocks noGrp="1"/>
           </p:cNvSpPr>
@@ -1440,13 +1266,7 @@
       </p:sp>
       <p:sp>
         <p:nvSpPr>
-          <p:cNvPr id="7" name="Marcador de número de diapositiva 6">
-            <a:extLst>
-              <a:ext uri="{FF2B5EF4-FFF2-40B4-BE49-F238E27FC236}">
-                <a16:creationId xmlns:a16="http://schemas.microsoft.com/office/drawing/2014/main" id="{332E132E-B25F-465C-91B5-C2EF41580DFD}"/>
-              </a:ext>
-            </a:extLst>
-          </p:cNvPr>
+          <p:cNvPr id="7" name="Slide Number Placeholder 6"/>
           <p:cNvSpPr>
             <a:spLocks noGrp="1"/>
           </p:cNvSpPr>
@@ -1470,7 +1290,7 @@
     </p:spTree>
     <p:extLst>
       <p:ext uri="{BB962C8B-B14F-4D97-AF65-F5344CB8AC3E}">
-        <p14:creationId xmlns:p14="http://schemas.microsoft.com/office/powerpoint/2010/main" val="3168861040"/>
+        <p14:creationId xmlns:p14="http://schemas.microsoft.com/office/powerpoint/2010/main" val="699165142"/>
       </p:ext>
     </p:extLst>
   </p:cSld>
@@ -1499,13 +1319,7 @@
       </p:grpSpPr>
       <p:sp>
         <p:nvSpPr>
-          <p:cNvPr id="2" name="Título 1">
-            <a:extLst>
-              <a:ext uri="{FF2B5EF4-FFF2-40B4-BE49-F238E27FC236}">
-                <a16:creationId xmlns:a16="http://schemas.microsoft.com/office/drawing/2014/main" id="{FD30E4D6-B61E-4A88-9D9D-4B3AFF3AD421}"/>
-              </a:ext>
-            </a:extLst>
-          </p:cNvPr>
+          <p:cNvPr id="2" name="Title 1"/>
           <p:cNvSpPr>
             <a:spLocks noGrp="1"/>
           </p:cNvSpPr>
@@ -1515,8 +1329,8 @@
         </p:nvSpPr>
         <p:spPr>
           <a:xfrm>
-            <a:off x="839788" y="365125"/>
-            <a:ext cx="10515600" cy="1325563"/>
+            <a:off x="682328" y="365127"/>
+            <a:ext cx="8543925" cy="1325563"/>
           </a:xfrm>
         </p:spPr>
         <p:txBody>
@@ -1527,18 +1341,13 @@
               <a:rPr lang="es-ES"/>
               <a:t>Haga clic para modificar el estilo de título del patrón</a:t>
             </a:r>
-          </a:p>
-        </p:txBody>
-      </p:sp>
-      <p:sp>
-        <p:nvSpPr>
-          <p:cNvPr id="3" name="Marcador de texto 2">
-            <a:extLst>
-              <a:ext uri="{FF2B5EF4-FFF2-40B4-BE49-F238E27FC236}">
-                <a16:creationId xmlns:a16="http://schemas.microsoft.com/office/drawing/2014/main" id="{089E518C-4C53-474D-9C6B-3D4B47327440}"/>
-              </a:ext>
-            </a:extLst>
-          </p:cNvPr>
+            <a:endParaRPr lang="en-US" dirty="0"/>
+          </a:p>
+        </p:txBody>
+      </p:sp>
+      <p:sp>
+        <p:nvSpPr>
+          <p:cNvPr id="3" name="Text Placeholder 2"/>
           <p:cNvSpPr>
             <a:spLocks noGrp="1"/>
           </p:cNvSpPr>
@@ -1548,8 +1357,8 @@
         </p:nvSpPr>
         <p:spPr>
           <a:xfrm>
-            <a:off x="839788" y="1681163"/>
-            <a:ext cx="5157787" cy="823912"/>
+            <a:off x="682329" y="1681163"/>
+            <a:ext cx="4190702" cy="823912"/>
           </a:xfrm>
         </p:spPr>
         <p:txBody>
@@ -1603,13 +1412,7 @@
       </p:sp>
       <p:sp>
         <p:nvSpPr>
-          <p:cNvPr id="4" name="Marcador de contenido 3">
-            <a:extLst>
-              <a:ext uri="{FF2B5EF4-FFF2-40B4-BE49-F238E27FC236}">
-                <a16:creationId xmlns:a16="http://schemas.microsoft.com/office/drawing/2014/main" id="{814C44F5-3484-4196-BDEE-53AD8E85630A}"/>
-              </a:ext>
-            </a:extLst>
-          </p:cNvPr>
+          <p:cNvPr id="4" name="Content Placeholder 3"/>
           <p:cNvSpPr>
             <a:spLocks noGrp="1"/>
           </p:cNvSpPr>
@@ -1619,8 +1422,8 @@
         </p:nvSpPr>
         <p:spPr>
           <a:xfrm>
-            <a:off x="839788" y="2505075"/>
-            <a:ext cx="5157787" cy="3684588"/>
+            <a:off x="682329" y="2505075"/>
+            <a:ext cx="4190702" cy="3684588"/>
           </a:xfrm>
         </p:spPr>
         <p:txBody>
@@ -1660,18 +1463,13 @@
               <a:rPr lang="es-ES"/>
               <a:t>Quinto nivel</a:t>
             </a:r>
-          </a:p>
-        </p:txBody>
-      </p:sp>
-      <p:sp>
-        <p:nvSpPr>
-          <p:cNvPr id="5" name="Marcador de texto 4">
-            <a:extLst>
-              <a:ext uri="{FF2B5EF4-FFF2-40B4-BE49-F238E27FC236}">
-                <a16:creationId xmlns:a16="http://schemas.microsoft.com/office/drawing/2014/main" id="{2C1A998C-3FDC-4B1E-8E70-0062D8CF9EDE}"/>
-              </a:ext>
-            </a:extLst>
-          </p:cNvPr>
+            <a:endParaRPr lang="en-US" dirty="0"/>
+          </a:p>
+        </p:txBody>
+      </p:sp>
+      <p:sp>
+        <p:nvSpPr>
+          <p:cNvPr id="5" name="Text Placeholder 4"/>
           <p:cNvSpPr>
             <a:spLocks noGrp="1"/>
           </p:cNvSpPr>
@@ -1681,8 +1479,8 @@
         </p:nvSpPr>
         <p:spPr>
           <a:xfrm>
-            <a:off x="6172200" y="1681163"/>
-            <a:ext cx="5183188" cy="823912"/>
+            <a:off x="5014913" y="1681163"/>
+            <a:ext cx="4211340" cy="823912"/>
           </a:xfrm>
         </p:spPr>
         <p:txBody>
@@ -1736,13 +1534,7 @@
       </p:sp>
       <p:sp>
         <p:nvSpPr>
-          <p:cNvPr id="6" name="Marcador de contenido 5">
-            <a:extLst>
-              <a:ext uri="{FF2B5EF4-FFF2-40B4-BE49-F238E27FC236}">
-                <a16:creationId xmlns:a16="http://schemas.microsoft.com/office/drawing/2014/main" id="{B5C16E52-517E-448B-A2D7-43D8C43041C9}"/>
-              </a:ext>
-            </a:extLst>
-          </p:cNvPr>
+          <p:cNvPr id="6" name="Content Placeholder 5"/>
           <p:cNvSpPr>
             <a:spLocks noGrp="1"/>
           </p:cNvSpPr>
@@ -1752,8 +1544,8 @@
         </p:nvSpPr>
         <p:spPr>
           <a:xfrm>
-            <a:off x="6172200" y="2505075"/>
-            <a:ext cx="5183188" cy="3684588"/>
+            <a:off x="5014913" y="2505075"/>
+            <a:ext cx="4211340" cy="3684588"/>
           </a:xfrm>
         </p:spPr>
         <p:txBody>
@@ -1793,18 +1585,13 @@
               <a:rPr lang="es-ES"/>
               <a:t>Quinto nivel</a:t>
             </a:r>
-          </a:p>
-        </p:txBody>
-      </p:sp>
-      <p:sp>
-        <p:nvSpPr>
-          <p:cNvPr id="7" name="Marcador de fecha 6">
-            <a:extLst>
-              <a:ext uri="{FF2B5EF4-FFF2-40B4-BE49-F238E27FC236}">
-                <a16:creationId xmlns:a16="http://schemas.microsoft.com/office/drawing/2014/main" id="{56350166-6768-4400-87BB-25A77D1D1C07}"/>
-              </a:ext>
-            </a:extLst>
-          </p:cNvPr>
+            <a:endParaRPr lang="en-US" dirty="0"/>
+          </a:p>
+        </p:txBody>
+      </p:sp>
+      <p:sp>
+        <p:nvSpPr>
+          <p:cNvPr id="7" name="Date Placeholder 6"/>
           <p:cNvSpPr>
             <a:spLocks noGrp="1"/>
           </p:cNvSpPr>
@@ -1819,7 +1606,7 @@
           <a:p>
             <a:fld id="{F934F427-73AC-4E1C-B145-1BB7D3FBF73B}" type="datetimeFigureOut">
               <a:rPr lang="es-ES" smtClean="0"/>
-              <a:t>09/01/2018</a:t>
+              <a:t>11/01/2018</a:t>
             </a:fld>
             <a:endParaRPr lang="es-ES"/>
           </a:p>
@@ -1827,13 +1614,7 @@
       </p:sp>
       <p:sp>
         <p:nvSpPr>
-          <p:cNvPr id="8" name="Marcador de pie de página 7">
-            <a:extLst>
-              <a:ext uri="{FF2B5EF4-FFF2-40B4-BE49-F238E27FC236}">
-                <a16:creationId xmlns:a16="http://schemas.microsoft.com/office/drawing/2014/main" id="{B3371306-C91A-442F-AA55-D800F0748B47}"/>
-              </a:ext>
-            </a:extLst>
-          </p:cNvPr>
+          <p:cNvPr id="8" name="Footer Placeholder 7"/>
           <p:cNvSpPr>
             <a:spLocks noGrp="1"/>
           </p:cNvSpPr>
@@ -1852,13 +1633,7 @@
       </p:sp>
       <p:sp>
         <p:nvSpPr>
-          <p:cNvPr id="9" name="Marcador de número de diapositiva 8">
-            <a:extLst>
-              <a:ext uri="{FF2B5EF4-FFF2-40B4-BE49-F238E27FC236}">
-                <a16:creationId xmlns:a16="http://schemas.microsoft.com/office/drawing/2014/main" id="{19106204-D866-4153-81AA-25194E36717B}"/>
-              </a:ext>
-            </a:extLst>
-          </p:cNvPr>
+          <p:cNvPr id="9" name="Slide Number Placeholder 8"/>
           <p:cNvSpPr>
             <a:spLocks noGrp="1"/>
           </p:cNvSpPr>
@@ -1882,7 +1657,7 @@
     </p:spTree>
     <p:extLst>
       <p:ext uri="{BB962C8B-B14F-4D97-AF65-F5344CB8AC3E}">
-        <p14:creationId xmlns:p14="http://schemas.microsoft.com/office/powerpoint/2010/main" val="2137577450"/>
+        <p14:creationId xmlns:p14="http://schemas.microsoft.com/office/powerpoint/2010/main" val="4201932145"/>
       </p:ext>
     </p:extLst>
   </p:cSld>
@@ -1911,13 +1686,7 @@
       </p:grpSpPr>
       <p:sp>
         <p:nvSpPr>
-          <p:cNvPr id="2" name="Título 1">
-            <a:extLst>
-              <a:ext uri="{FF2B5EF4-FFF2-40B4-BE49-F238E27FC236}">
-                <a16:creationId xmlns:a16="http://schemas.microsoft.com/office/drawing/2014/main" id="{01A3FBE5-5636-44AE-AEB4-7FF39D810B97}"/>
-              </a:ext>
-            </a:extLst>
-          </p:cNvPr>
+          <p:cNvPr id="2" name="Title 1"/>
           <p:cNvSpPr>
             <a:spLocks noGrp="1"/>
           </p:cNvSpPr>
@@ -1934,18 +1703,13 @@
               <a:rPr lang="es-ES"/>
               <a:t>Haga clic para modificar el estilo de título del patrón</a:t>
             </a:r>
-          </a:p>
-        </p:txBody>
-      </p:sp>
-      <p:sp>
-        <p:nvSpPr>
-          <p:cNvPr id="3" name="Marcador de fecha 2">
-            <a:extLst>
-              <a:ext uri="{FF2B5EF4-FFF2-40B4-BE49-F238E27FC236}">
-                <a16:creationId xmlns:a16="http://schemas.microsoft.com/office/drawing/2014/main" id="{9EC0193D-30EF-4EDF-80D2-DF63C5909AB8}"/>
-              </a:ext>
-            </a:extLst>
-          </p:cNvPr>
+            <a:endParaRPr lang="en-US" dirty="0"/>
+          </a:p>
+        </p:txBody>
+      </p:sp>
+      <p:sp>
+        <p:nvSpPr>
+          <p:cNvPr id="3" name="Date Placeholder 2"/>
           <p:cNvSpPr>
             <a:spLocks noGrp="1"/>
           </p:cNvSpPr>
@@ -1960,7 +1724,7 @@
           <a:p>
             <a:fld id="{F934F427-73AC-4E1C-B145-1BB7D3FBF73B}" type="datetimeFigureOut">
               <a:rPr lang="es-ES" smtClean="0"/>
-              <a:t>09/01/2018</a:t>
+              <a:t>11/01/2018</a:t>
             </a:fld>
             <a:endParaRPr lang="es-ES"/>
           </a:p>
@@ -1968,13 +1732,7 @@
       </p:sp>
       <p:sp>
         <p:nvSpPr>
-          <p:cNvPr id="4" name="Marcador de pie de página 3">
-            <a:extLst>
-              <a:ext uri="{FF2B5EF4-FFF2-40B4-BE49-F238E27FC236}">
-                <a16:creationId xmlns:a16="http://schemas.microsoft.com/office/drawing/2014/main" id="{1176D0C6-4FE1-4981-BFEE-99DD8B5E39BA}"/>
-              </a:ext>
-            </a:extLst>
-          </p:cNvPr>
+          <p:cNvPr id="4" name="Footer Placeholder 3"/>
           <p:cNvSpPr>
             <a:spLocks noGrp="1"/>
           </p:cNvSpPr>
@@ -1993,13 +1751,7 @@
       </p:sp>
       <p:sp>
         <p:nvSpPr>
-          <p:cNvPr id="5" name="Marcador de número de diapositiva 4">
-            <a:extLst>
-              <a:ext uri="{FF2B5EF4-FFF2-40B4-BE49-F238E27FC236}">
-                <a16:creationId xmlns:a16="http://schemas.microsoft.com/office/drawing/2014/main" id="{897F1BCC-4404-4364-AA3C-52504DA706A9}"/>
-              </a:ext>
-            </a:extLst>
-          </p:cNvPr>
+          <p:cNvPr id="5" name="Slide Number Placeholder 4"/>
           <p:cNvSpPr>
             <a:spLocks noGrp="1"/>
           </p:cNvSpPr>
@@ -2023,7 +1775,7 @@
     </p:spTree>
     <p:extLst>
       <p:ext uri="{BB962C8B-B14F-4D97-AF65-F5344CB8AC3E}">
-        <p14:creationId xmlns:p14="http://schemas.microsoft.com/office/powerpoint/2010/main" val="533251201"/>
+        <p14:creationId xmlns:p14="http://schemas.microsoft.com/office/powerpoint/2010/main" val="1558759189"/>
       </p:ext>
     </p:extLst>
   </p:cSld>
@@ -2052,13 +1804,7 @@
       </p:grpSpPr>
       <p:sp>
         <p:nvSpPr>
-          <p:cNvPr id="2" name="Marcador de fecha 1">
-            <a:extLst>
-              <a:ext uri="{FF2B5EF4-FFF2-40B4-BE49-F238E27FC236}">
-                <a16:creationId xmlns:a16="http://schemas.microsoft.com/office/drawing/2014/main" id="{8E4A429B-E4CF-4EDC-AAA8-B48A440D7B93}"/>
-              </a:ext>
-            </a:extLst>
-          </p:cNvPr>
+          <p:cNvPr id="2" name="Date Placeholder 1"/>
           <p:cNvSpPr>
             <a:spLocks noGrp="1"/>
           </p:cNvSpPr>
@@ -2073,7 +1819,7 @@
           <a:p>
             <a:fld id="{F934F427-73AC-4E1C-B145-1BB7D3FBF73B}" type="datetimeFigureOut">
               <a:rPr lang="es-ES" smtClean="0"/>
-              <a:t>09/01/2018</a:t>
+              <a:t>11/01/2018</a:t>
             </a:fld>
             <a:endParaRPr lang="es-ES"/>
           </a:p>
@@ -2081,13 +1827,7 @@
       </p:sp>
       <p:sp>
         <p:nvSpPr>
-          <p:cNvPr id="3" name="Marcador de pie de página 2">
-            <a:extLst>
-              <a:ext uri="{FF2B5EF4-FFF2-40B4-BE49-F238E27FC236}">
-                <a16:creationId xmlns:a16="http://schemas.microsoft.com/office/drawing/2014/main" id="{0E0471C3-A208-4790-B5FC-09C950C09A38}"/>
-              </a:ext>
-            </a:extLst>
-          </p:cNvPr>
+          <p:cNvPr id="3" name="Footer Placeholder 2"/>
           <p:cNvSpPr>
             <a:spLocks noGrp="1"/>
           </p:cNvSpPr>
@@ -2106,13 +1846,7 @@
       </p:sp>
       <p:sp>
         <p:nvSpPr>
-          <p:cNvPr id="4" name="Marcador de número de diapositiva 3">
-            <a:extLst>
-              <a:ext uri="{FF2B5EF4-FFF2-40B4-BE49-F238E27FC236}">
-                <a16:creationId xmlns:a16="http://schemas.microsoft.com/office/drawing/2014/main" id="{1CA97F11-434E-4C93-9CEC-CC303B82F48B}"/>
-              </a:ext>
-            </a:extLst>
-          </p:cNvPr>
+          <p:cNvPr id="4" name="Slide Number Placeholder 3"/>
           <p:cNvSpPr>
             <a:spLocks noGrp="1"/>
           </p:cNvSpPr>
@@ -2136,7 +1870,7 @@
     </p:spTree>
     <p:extLst>
       <p:ext uri="{BB962C8B-B14F-4D97-AF65-F5344CB8AC3E}">
-        <p14:creationId xmlns:p14="http://schemas.microsoft.com/office/powerpoint/2010/main" val="1980745208"/>
+        <p14:creationId xmlns:p14="http://schemas.microsoft.com/office/powerpoint/2010/main" val="1705295731"/>
       </p:ext>
     </p:extLst>
   </p:cSld>
@@ -2165,13 +1899,7 @@
       </p:grpSpPr>
       <p:sp>
         <p:nvSpPr>
-          <p:cNvPr id="2" name="Título 1">
-            <a:extLst>
-              <a:ext uri="{FF2B5EF4-FFF2-40B4-BE49-F238E27FC236}">
-                <a16:creationId xmlns:a16="http://schemas.microsoft.com/office/drawing/2014/main" id="{B123678D-CB2E-4E6C-BF0C-F677E917D708}"/>
-              </a:ext>
-            </a:extLst>
-          </p:cNvPr>
+          <p:cNvPr id="2" name="Title 1"/>
           <p:cNvSpPr>
             <a:spLocks noGrp="1"/>
           </p:cNvSpPr>
@@ -2181,8 +1909,8 @@
         </p:nvSpPr>
         <p:spPr>
           <a:xfrm>
-            <a:off x="839788" y="457200"/>
-            <a:ext cx="3932237" cy="1600200"/>
+            <a:off x="682328" y="457200"/>
+            <a:ext cx="3194943" cy="1600200"/>
           </a:xfrm>
         </p:spPr>
         <p:txBody>
@@ -2197,18 +1925,13 @@
               <a:rPr lang="es-ES"/>
               <a:t>Haga clic para modificar el estilo de título del patrón</a:t>
             </a:r>
-          </a:p>
-        </p:txBody>
-      </p:sp>
-      <p:sp>
-        <p:nvSpPr>
-          <p:cNvPr id="3" name="Marcador de contenido 2">
-            <a:extLst>
-              <a:ext uri="{FF2B5EF4-FFF2-40B4-BE49-F238E27FC236}">
-                <a16:creationId xmlns:a16="http://schemas.microsoft.com/office/drawing/2014/main" id="{C5BF2BAC-DA12-45EA-BCC1-37637C571FC4}"/>
-              </a:ext>
-            </a:extLst>
-          </p:cNvPr>
+            <a:endParaRPr lang="en-US" dirty="0"/>
+          </a:p>
+        </p:txBody>
+      </p:sp>
+      <p:sp>
+        <p:nvSpPr>
+          <p:cNvPr id="3" name="Content Placeholder 2"/>
           <p:cNvSpPr>
             <a:spLocks noGrp="1"/>
           </p:cNvSpPr>
@@ -2218,8 +1941,8 @@
         </p:nvSpPr>
         <p:spPr>
           <a:xfrm>
-            <a:off x="5183188" y="987425"/>
-            <a:ext cx="6172200" cy="4873625"/>
+            <a:off x="4211340" y="987427"/>
+            <a:ext cx="5014913" cy="4873625"/>
           </a:xfrm>
         </p:spPr>
         <p:txBody>
@@ -2287,18 +2010,13 @@
               <a:rPr lang="es-ES"/>
               <a:t>Quinto nivel</a:t>
             </a:r>
-          </a:p>
-        </p:txBody>
-      </p:sp>
-      <p:sp>
-        <p:nvSpPr>
-          <p:cNvPr id="4" name="Marcador de texto 3">
-            <a:extLst>
-              <a:ext uri="{FF2B5EF4-FFF2-40B4-BE49-F238E27FC236}">
-                <a16:creationId xmlns:a16="http://schemas.microsoft.com/office/drawing/2014/main" id="{D72E267C-7DA1-4861-A52B-7F17D15D1F19}"/>
-              </a:ext>
-            </a:extLst>
-          </p:cNvPr>
+            <a:endParaRPr lang="en-US" dirty="0"/>
+          </a:p>
+        </p:txBody>
+      </p:sp>
+      <p:sp>
+        <p:nvSpPr>
+          <p:cNvPr id="4" name="Text Placeholder 3"/>
           <p:cNvSpPr>
             <a:spLocks noGrp="1"/>
           </p:cNvSpPr>
@@ -2308,8 +2026,8 @@
         </p:nvSpPr>
         <p:spPr>
           <a:xfrm>
-            <a:off x="839788" y="2057400"/>
-            <a:ext cx="3932237" cy="3811588"/>
+            <a:off x="682328" y="2057400"/>
+            <a:ext cx="3194943" cy="3811588"/>
           </a:xfrm>
         </p:spPr>
         <p:txBody>
@@ -2363,13 +2081,7 @@
       </p:sp>
       <p:sp>
         <p:nvSpPr>
-          <p:cNvPr id="5" name="Marcador de fecha 4">
-            <a:extLst>
-              <a:ext uri="{FF2B5EF4-FFF2-40B4-BE49-F238E27FC236}">
-                <a16:creationId xmlns:a16="http://schemas.microsoft.com/office/drawing/2014/main" id="{C7EE5763-6D38-4B0E-978D-8C5B529316FF}"/>
-              </a:ext>
-            </a:extLst>
-          </p:cNvPr>
+          <p:cNvPr id="5" name="Date Placeholder 4"/>
           <p:cNvSpPr>
             <a:spLocks noGrp="1"/>
           </p:cNvSpPr>
@@ -2384,7 +2096,7 @@
           <a:p>
             <a:fld id="{F934F427-73AC-4E1C-B145-1BB7D3FBF73B}" type="datetimeFigureOut">
               <a:rPr lang="es-ES" smtClean="0"/>
-              <a:t>09/01/2018</a:t>
+              <a:t>11/01/2018</a:t>
             </a:fld>
             <a:endParaRPr lang="es-ES"/>
           </a:p>
@@ -2392,13 +2104,7 @@
       </p:sp>
       <p:sp>
         <p:nvSpPr>
-          <p:cNvPr id="6" name="Marcador de pie de página 5">
-            <a:extLst>
-              <a:ext uri="{FF2B5EF4-FFF2-40B4-BE49-F238E27FC236}">
-                <a16:creationId xmlns:a16="http://schemas.microsoft.com/office/drawing/2014/main" id="{9EF98ECA-BE04-4C1B-AAD2-6D9A3DB0E700}"/>
-              </a:ext>
-            </a:extLst>
-          </p:cNvPr>
+          <p:cNvPr id="6" name="Footer Placeholder 5"/>
           <p:cNvSpPr>
             <a:spLocks noGrp="1"/>
           </p:cNvSpPr>
@@ -2417,13 +2123,7 @@
       </p:sp>
       <p:sp>
         <p:nvSpPr>
-          <p:cNvPr id="7" name="Marcador de número de diapositiva 6">
-            <a:extLst>
-              <a:ext uri="{FF2B5EF4-FFF2-40B4-BE49-F238E27FC236}">
-                <a16:creationId xmlns:a16="http://schemas.microsoft.com/office/drawing/2014/main" id="{9681F638-8A6A-4BE7-8D1B-578613E77387}"/>
-              </a:ext>
-            </a:extLst>
-          </p:cNvPr>
+          <p:cNvPr id="7" name="Slide Number Placeholder 6"/>
           <p:cNvSpPr>
             <a:spLocks noGrp="1"/>
           </p:cNvSpPr>
@@ -2447,7 +2147,7 @@
     </p:spTree>
     <p:extLst>
       <p:ext uri="{BB962C8B-B14F-4D97-AF65-F5344CB8AC3E}">
-        <p14:creationId xmlns:p14="http://schemas.microsoft.com/office/powerpoint/2010/main" val="1995584075"/>
+        <p14:creationId xmlns:p14="http://schemas.microsoft.com/office/powerpoint/2010/main" val="1771355877"/>
       </p:ext>
     </p:extLst>
   </p:cSld>
@@ -2476,13 +2176,7 @@
       </p:grpSpPr>
       <p:sp>
         <p:nvSpPr>
-          <p:cNvPr id="2" name="Título 1">
-            <a:extLst>
-              <a:ext uri="{FF2B5EF4-FFF2-40B4-BE49-F238E27FC236}">
-                <a16:creationId xmlns:a16="http://schemas.microsoft.com/office/drawing/2014/main" id="{BB349DD7-ECE5-4A5E-9090-7F8AEA7E3081}"/>
-              </a:ext>
-            </a:extLst>
-          </p:cNvPr>
+          <p:cNvPr id="2" name="Title 1"/>
           <p:cNvSpPr>
             <a:spLocks noGrp="1"/>
           </p:cNvSpPr>
@@ -2492,8 +2186,8 @@
         </p:nvSpPr>
         <p:spPr>
           <a:xfrm>
-            <a:off x="839788" y="457200"/>
-            <a:ext cx="3932237" cy="1600200"/>
+            <a:off x="682328" y="457200"/>
+            <a:ext cx="3194943" cy="1600200"/>
           </a:xfrm>
         </p:spPr>
         <p:txBody>
@@ -2508,20 +2202,15 @@
               <a:rPr lang="es-ES"/>
               <a:t>Haga clic para modificar el estilo de título del patrón</a:t>
             </a:r>
-          </a:p>
-        </p:txBody>
-      </p:sp>
-      <p:sp>
-        <p:nvSpPr>
-          <p:cNvPr id="3" name="Marcador de posición de imagen 2">
-            <a:extLst>
-              <a:ext uri="{FF2B5EF4-FFF2-40B4-BE49-F238E27FC236}">
-                <a16:creationId xmlns:a16="http://schemas.microsoft.com/office/drawing/2014/main" id="{A1426233-CDB3-4D4D-9D14-279A35FBAB6D}"/>
-              </a:ext>
-            </a:extLst>
-          </p:cNvPr>
-          <p:cNvSpPr>
-            <a:spLocks noGrp="1"/>
+            <a:endParaRPr lang="en-US" dirty="0"/>
+          </a:p>
+        </p:txBody>
+      </p:sp>
+      <p:sp>
+        <p:nvSpPr>
+          <p:cNvPr id="3" name="Picture Placeholder 2"/>
+          <p:cNvSpPr>
+            <a:spLocks noGrp="1" noChangeAspect="1"/>
           </p:cNvSpPr>
           <p:nvPr>
             <p:ph type="pic" idx="1"/>
@@ -2529,8 +2218,73 @@
         </p:nvSpPr>
         <p:spPr>
           <a:xfrm>
-            <a:off x="5183188" y="987425"/>
-            <a:ext cx="6172200" cy="4873625"/>
+            <a:off x="4211340" y="987427"/>
+            <a:ext cx="5014913" cy="4873625"/>
+          </a:xfrm>
+        </p:spPr>
+        <p:txBody>
+          <a:bodyPr anchor="t"/>
+          <a:lstStyle>
+            <a:lvl1pPr marL="0" indent="0">
+              <a:buNone/>
+              <a:defRPr sz="3200"/>
+            </a:lvl1pPr>
+            <a:lvl2pPr marL="457200" indent="0">
+              <a:buNone/>
+              <a:defRPr sz="2800"/>
+            </a:lvl2pPr>
+            <a:lvl3pPr marL="914400" indent="0">
+              <a:buNone/>
+              <a:defRPr sz="2400"/>
+            </a:lvl3pPr>
+            <a:lvl4pPr marL="1371600" indent="0">
+              <a:buNone/>
+              <a:defRPr sz="2000"/>
+            </a:lvl4pPr>
+            <a:lvl5pPr marL="1828800" indent="0">
+              <a:buNone/>
+              <a:defRPr sz="2000"/>
+            </a:lvl5pPr>
+            <a:lvl6pPr marL="2286000" indent="0">
+              <a:buNone/>
+              <a:defRPr sz="2000"/>
+            </a:lvl6pPr>
+            <a:lvl7pPr marL="2743200" indent="0">
+              <a:buNone/>
+              <a:defRPr sz="2000"/>
+            </a:lvl7pPr>
+            <a:lvl8pPr marL="3200400" indent="0">
+              <a:buNone/>
+              <a:defRPr sz="2000"/>
+            </a:lvl8pPr>
+            <a:lvl9pPr marL="3657600" indent="0">
+              <a:buNone/>
+              <a:defRPr sz="2000"/>
+            </a:lvl9pPr>
+          </a:lstStyle>
+          <a:p>
+            <a:r>
+              <a:rPr lang="es-ES"/>
+              <a:t>Haga clic en el icono para agregar una imagen</a:t>
+            </a:r>
+            <a:endParaRPr lang="en-US" dirty="0"/>
+          </a:p>
+        </p:txBody>
+      </p:sp>
+      <p:sp>
+        <p:nvSpPr>
+          <p:cNvPr id="4" name="Text Placeholder 3"/>
+          <p:cNvSpPr>
+            <a:spLocks noGrp="1"/>
+          </p:cNvSpPr>
+          <p:nvPr>
+            <p:ph type="body" sz="half" idx="2"/>
+          </p:nvPr>
+        </p:nvSpPr>
+        <p:spPr>
+          <a:xfrm>
+            <a:off x="682328" y="2057400"/>
+            <a:ext cx="3194943" cy="3811588"/>
           </a:xfrm>
         </p:spPr>
         <p:txBody>
@@ -2538,73 +2292,6 @@
           <a:lstStyle>
             <a:lvl1pPr marL="0" indent="0">
               <a:buNone/>
-              <a:defRPr sz="3200"/>
-            </a:lvl1pPr>
-            <a:lvl2pPr marL="457200" indent="0">
-              <a:buNone/>
-              <a:defRPr sz="2800"/>
-            </a:lvl2pPr>
-            <a:lvl3pPr marL="914400" indent="0">
-              <a:buNone/>
-              <a:defRPr sz="2400"/>
-            </a:lvl3pPr>
-            <a:lvl4pPr marL="1371600" indent="0">
-              <a:buNone/>
-              <a:defRPr sz="2000"/>
-            </a:lvl4pPr>
-            <a:lvl5pPr marL="1828800" indent="0">
-              <a:buNone/>
-              <a:defRPr sz="2000"/>
-            </a:lvl5pPr>
-            <a:lvl6pPr marL="2286000" indent="0">
-              <a:buNone/>
-              <a:defRPr sz="2000"/>
-            </a:lvl6pPr>
-            <a:lvl7pPr marL="2743200" indent="0">
-              <a:buNone/>
-              <a:defRPr sz="2000"/>
-            </a:lvl7pPr>
-            <a:lvl8pPr marL="3200400" indent="0">
-              <a:buNone/>
-              <a:defRPr sz="2000"/>
-            </a:lvl8pPr>
-            <a:lvl9pPr marL="3657600" indent="0">
-              <a:buNone/>
-              <a:defRPr sz="2000"/>
-            </a:lvl9pPr>
-          </a:lstStyle>
-          <a:p>
-            <a:endParaRPr lang="es-ES"/>
-          </a:p>
-        </p:txBody>
-      </p:sp>
-      <p:sp>
-        <p:nvSpPr>
-          <p:cNvPr id="4" name="Marcador de texto 3">
-            <a:extLst>
-              <a:ext uri="{FF2B5EF4-FFF2-40B4-BE49-F238E27FC236}">
-                <a16:creationId xmlns:a16="http://schemas.microsoft.com/office/drawing/2014/main" id="{3FE33CB6-F2E5-422C-8E05-7A3E4CF386BD}"/>
-              </a:ext>
-            </a:extLst>
-          </p:cNvPr>
-          <p:cNvSpPr>
-            <a:spLocks noGrp="1"/>
-          </p:cNvSpPr>
-          <p:nvPr>
-            <p:ph type="body" sz="half" idx="2"/>
-          </p:nvPr>
-        </p:nvSpPr>
-        <p:spPr>
-          <a:xfrm>
-            <a:off x="839788" y="2057400"/>
-            <a:ext cx="3932237" cy="3811588"/>
-          </a:xfrm>
-        </p:spPr>
-        <p:txBody>
-          <a:bodyPr/>
-          <a:lstStyle>
-            <a:lvl1pPr marL="0" indent="0">
-              <a:buNone/>
               <a:defRPr sz="1600"/>
             </a:lvl1pPr>
             <a:lvl2pPr marL="457200" indent="0">
@@ -2651,13 +2338,7 @@
       </p:sp>
       <p:sp>
         <p:nvSpPr>
-          <p:cNvPr id="5" name="Marcador de fecha 4">
-            <a:extLst>
-              <a:ext uri="{FF2B5EF4-FFF2-40B4-BE49-F238E27FC236}">
-                <a16:creationId xmlns:a16="http://schemas.microsoft.com/office/drawing/2014/main" id="{F86AE42D-7AE3-4385-BADF-FE38E843CEE1}"/>
-              </a:ext>
-            </a:extLst>
-          </p:cNvPr>
+          <p:cNvPr id="5" name="Date Placeholder 4"/>
           <p:cNvSpPr>
             <a:spLocks noGrp="1"/>
           </p:cNvSpPr>
@@ -2672,7 +2353,7 @@
           <a:p>
             <a:fld id="{F934F427-73AC-4E1C-B145-1BB7D3FBF73B}" type="datetimeFigureOut">
               <a:rPr lang="es-ES" smtClean="0"/>
-              <a:t>09/01/2018</a:t>
+              <a:t>11/01/2018</a:t>
             </a:fld>
             <a:endParaRPr lang="es-ES"/>
           </a:p>
@@ -2680,13 +2361,7 @@
       </p:sp>
       <p:sp>
         <p:nvSpPr>
-          <p:cNvPr id="6" name="Marcador de pie de página 5">
-            <a:extLst>
-              <a:ext uri="{FF2B5EF4-FFF2-40B4-BE49-F238E27FC236}">
-                <a16:creationId xmlns:a16="http://schemas.microsoft.com/office/drawing/2014/main" id="{A42F66D0-5D27-4BE8-A2F2-5A1FBF0C6716}"/>
-              </a:ext>
-            </a:extLst>
-          </p:cNvPr>
+          <p:cNvPr id="6" name="Footer Placeholder 5"/>
           <p:cNvSpPr>
             <a:spLocks noGrp="1"/>
           </p:cNvSpPr>
@@ -2705,13 +2380,7 @@
       </p:sp>
       <p:sp>
         <p:nvSpPr>
-          <p:cNvPr id="7" name="Marcador de número de diapositiva 6">
-            <a:extLst>
-              <a:ext uri="{FF2B5EF4-FFF2-40B4-BE49-F238E27FC236}">
-                <a16:creationId xmlns:a16="http://schemas.microsoft.com/office/drawing/2014/main" id="{9FE07359-83B1-4E97-A6A3-4F2BB3E2A1CB}"/>
-              </a:ext>
-            </a:extLst>
-          </p:cNvPr>
+          <p:cNvPr id="7" name="Slide Number Placeholder 6"/>
           <p:cNvSpPr>
             <a:spLocks noGrp="1"/>
           </p:cNvSpPr>
@@ -2735,7 +2404,7 @@
     </p:spTree>
     <p:extLst>
       <p:ext uri="{BB962C8B-B14F-4D97-AF65-F5344CB8AC3E}">
-        <p14:creationId xmlns:p14="http://schemas.microsoft.com/office/powerpoint/2010/main" val="2896910692"/>
+        <p14:creationId xmlns:p14="http://schemas.microsoft.com/office/powerpoint/2010/main" val="1747160073"/>
       </p:ext>
     </p:extLst>
   </p:cSld>
@@ -2769,13 +2438,7 @@
       </p:grpSpPr>
       <p:sp>
         <p:nvSpPr>
-          <p:cNvPr id="2" name="Marcador de título 1">
-            <a:extLst>
-              <a:ext uri="{FF2B5EF4-FFF2-40B4-BE49-F238E27FC236}">
-                <a16:creationId xmlns:a16="http://schemas.microsoft.com/office/drawing/2014/main" id="{8E671A7F-D8E7-4247-8219-D1E26A8FA37A}"/>
-              </a:ext>
-            </a:extLst>
-          </p:cNvPr>
+          <p:cNvPr id="2" name="Title Placeholder 1"/>
           <p:cNvSpPr>
             <a:spLocks noGrp="1"/>
           </p:cNvSpPr>
@@ -2785,8 +2448,8 @@
         </p:nvSpPr>
         <p:spPr>
           <a:xfrm>
-            <a:off x="838200" y="365125"/>
-            <a:ext cx="10515600" cy="1325563"/>
+            <a:off x="681038" y="365127"/>
+            <a:ext cx="8543925" cy="1325563"/>
           </a:xfrm>
           <a:prstGeom prst="rect">
             <a:avLst/>
@@ -2802,18 +2465,13 @@
               <a:rPr lang="es-ES"/>
               <a:t>Haga clic para modificar el estilo de título del patrón</a:t>
             </a:r>
-          </a:p>
-        </p:txBody>
-      </p:sp>
-      <p:sp>
-        <p:nvSpPr>
-          <p:cNvPr id="3" name="Marcador de texto 2">
-            <a:extLst>
-              <a:ext uri="{FF2B5EF4-FFF2-40B4-BE49-F238E27FC236}">
-                <a16:creationId xmlns:a16="http://schemas.microsoft.com/office/drawing/2014/main" id="{0E5D0709-F36E-4E93-942E-267E54D48FE0}"/>
-              </a:ext>
-            </a:extLst>
-          </p:cNvPr>
+            <a:endParaRPr lang="en-US" dirty="0"/>
+          </a:p>
+        </p:txBody>
+      </p:sp>
+      <p:sp>
+        <p:nvSpPr>
+          <p:cNvPr id="3" name="Text Placeholder 2"/>
           <p:cNvSpPr>
             <a:spLocks noGrp="1"/>
           </p:cNvSpPr>
@@ -2823,8 +2481,8 @@
         </p:nvSpPr>
         <p:spPr>
           <a:xfrm>
-            <a:off x="838200" y="1825625"/>
-            <a:ext cx="10515600" cy="4351338"/>
+            <a:off x="681038" y="1825625"/>
+            <a:ext cx="8543925" cy="4351338"/>
           </a:xfrm>
           <a:prstGeom prst="rect">
             <a:avLst/>
@@ -2869,18 +2527,13 @@
               <a:rPr lang="es-ES"/>
               <a:t>Quinto nivel</a:t>
             </a:r>
-          </a:p>
-        </p:txBody>
-      </p:sp>
-      <p:sp>
-        <p:nvSpPr>
-          <p:cNvPr id="4" name="Marcador de fecha 3">
-            <a:extLst>
-              <a:ext uri="{FF2B5EF4-FFF2-40B4-BE49-F238E27FC236}">
-                <a16:creationId xmlns:a16="http://schemas.microsoft.com/office/drawing/2014/main" id="{54B66AC0-4D6D-4FA6-9501-1B5030985092}"/>
-              </a:ext>
-            </a:extLst>
-          </p:cNvPr>
+            <a:endParaRPr lang="en-US" dirty="0"/>
+          </a:p>
+        </p:txBody>
+      </p:sp>
+      <p:sp>
+        <p:nvSpPr>
+          <p:cNvPr id="4" name="Date Placeholder 3"/>
           <p:cNvSpPr>
             <a:spLocks noGrp="1"/>
           </p:cNvSpPr>
@@ -2890,8 +2543,8 @@
         </p:nvSpPr>
         <p:spPr>
           <a:xfrm>
-            <a:off x="838200" y="6356350"/>
-            <a:ext cx="2743200" cy="365125"/>
+            <a:off x="681038" y="6356352"/>
+            <a:ext cx="2228850" cy="365125"/>
           </a:xfrm>
           <a:prstGeom prst="rect">
             <a:avLst/>
@@ -2913,7 +2566,7 @@
           <a:p>
             <a:fld id="{F934F427-73AC-4E1C-B145-1BB7D3FBF73B}" type="datetimeFigureOut">
               <a:rPr lang="es-ES" smtClean="0"/>
-              <a:t>09/01/2018</a:t>
+              <a:t>11/01/2018</a:t>
             </a:fld>
             <a:endParaRPr lang="es-ES"/>
           </a:p>
@@ -2921,13 +2574,7 @@
       </p:sp>
       <p:sp>
         <p:nvSpPr>
-          <p:cNvPr id="5" name="Marcador de pie de página 4">
-            <a:extLst>
-              <a:ext uri="{FF2B5EF4-FFF2-40B4-BE49-F238E27FC236}">
-                <a16:creationId xmlns:a16="http://schemas.microsoft.com/office/drawing/2014/main" id="{A70EFC04-3CDB-499C-9B11-CF0E2D0514F7}"/>
-              </a:ext>
-            </a:extLst>
-          </p:cNvPr>
+          <p:cNvPr id="5" name="Footer Placeholder 4"/>
           <p:cNvSpPr>
             <a:spLocks noGrp="1"/>
           </p:cNvSpPr>
@@ -2937,8 +2584,8 @@
         </p:nvSpPr>
         <p:spPr>
           <a:xfrm>
-            <a:off x="4038600" y="6356350"/>
-            <a:ext cx="4114800" cy="365125"/>
+            <a:off x="3281363" y="6356352"/>
+            <a:ext cx="3343275" cy="365125"/>
           </a:xfrm>
           <a:prstGeom prst="rect">
             <a:avLst/>
@@ -2964,13 +2611,7 @@
       </p:sp>
       <p:sp>
         <p:nvSpPr>
-          <p:cNvPr id="6" name="Marcador de número de diapositiva 5">
-            <a:extLst>
-              <a:ext uri="{FF2B5EF4-FFF2-40B4-BE49-F238E27FC236}">
-                <a16:creationId xmlns:a16="http://schemas.microsoft.com/office/drawing/2014/main" id="{70F1B4F5-BA98-4C2D-B9D9-AC6B60C2F0C2}"/>
-              </a:ext>
-            </a:extLst>
-          </p:cNvPr>
+          <p:cNvPr id="6" name="Slide Number Placeholder 5"/>
           <p:cNvSpPr>
             <a:spLocks noGrp="1"/>
           </p:cNvSpPr>
@@ -2980,8 +2621,8 @@
         </p:nvSpPr>
         <p:spPr>
           <a:xfrm>
-            <a:off x="8610600" y="6356350"/>
-            <a:ext cx="2743200" cy="365125"/>
+            <a:off x="6996113" y="6356352"/>
+            <a:ext cx="2228850" cy="365125"/>
           </a:xfrm>
           <a:prstGeom prst="rect">
             <a:avLst/>
@@ -3012,23 +2653,23 @@
     </p:spTree>
     <p:extLst>
       <p:ext uri="{BB962C8B-B14F-4D97-AF65-F5344CB8AC3E}">
-        <p14:creationId xmlns:p14="http://schemas.microsoft.com/office/powerpoint/2010/main" val="4138426639"/>
+        <p14:creationId xmlns:p14="http://schemas.microsoft.com/office/powerpoint/2010/main" val="1201815882"/>
       </p:ext>
     </p:extLst>
   </p:cSld>
   <p:clrMap bg1="lt1" tx1="dk1" bg2="lt2" tx2="dk2" accent1="accent1" accent2="accent2" accent3="accent3" accent4="accent4" accent5="accent5" accent6="accent6" hlink="hlink" folHlink="folHlink"/>
   <p:sldLayoutIdLst>
-    <p:sldLayoutId id="2147483649" r:id="rId1"/>
-    <p:sldLayoutId id="2147483650" r:id="rId2"/>
-    <p:sldLayoutId id="2147483651" r:id="rId3"/>
-    <p:sldLayoutId id="2147483652" r:id="rId4"/>
-    <p:sldLayoutId id="2147483653" r:id="rId5"/>
-    <p:sldLayoutId id="2147483654" r:id="rId6"/>
-    <p:sldLayoutId id="2147483655" r:id="rId7"/>
-    <p:sldLayoutId id="2147483656" r:id="rId8"/>
-    <p:sldLayoutId id="2147483657" r:id="rId9"/>
-    <p:sldLayoutId id="2147483658" r:id="rId10"/>
-    <p:sldLayoutId id="2147483659" r:id="rId11"/>
+    <p:sldLayoutId id="2147483685" r:id="rId1"/>
+    <p:sldLayoutId id="2147483686" r:id="rId2"/>
+    <p:sldLayoutId id="2147483687" r:id="rId3"/>
+    <p:sldLayoutId id="2147483688" r:id="rId4"/>
+    <p:sldLayoutId id="2147483689" r:id="rId5"/>
+    <p:sldLayoutId id="2147483690" r:id="rId6"/>
+    <p:sldLayoutId id="2147483691" r:id="rId7"/>
+    <p:sldLayoutId id="2147483692" r:id="rId8"/>
+    <p:sldLayoutId id="2147483693" r:id="rId9"/>
+    <p:sldLayoutId id="2147483694" r:id="rId10"/>
+    <p:sldLayoutId id="2147483695" r:id="rId11"/>
   </p:sldLayoutIdLst>
   <p:txStyles>
     <p:titleStyle>
@@ -3216,7 +2857,7 @@
     </p:bodyStyle>
     <p:otherStyle>
       <a:defPPr>
-        <a:defRPr lang="es-ES"/>
+        <a:defRPr lang="en-US"/>
       </a:defPPr>
       <a:lvl1pPr marL="0" algn="l" defTabSz="914400" rtl="0" eaLnBrk="1" latinLnBrk="0" hangingPunct="1">
         <a:defRPr sz="1800" kern="1200">
@@ -3344,8 +2985,8 @@
         </p:nvSpPr>
         <p:spPr>
           <a:xfrm>
-            <a:off x="1065402" y="788566"/>
-            <a:ext cx="2281805" cy="1132513"/>
+            <a:off x="1487104" y="1625588"/>
+            <a:ext cx="1853967" cy="920167"/>
           </a:xfrm>
           <a:prstGeom prst="roundRect">
             <a:avLst/>
@@ -3380,7 +3021,7 @@
           <a:lstStyle/>
           <a:p>
             <a:pPr algn="ctr"/>
-            <a:endParaRPr lang="es-ES"/>
+            <a:endParaRPr lang="es-ES" sz="1463"/>
           </a:p>
         </p:txBody>
       </p:sp>
@@ -3398,8 +3039,8 @@
         </p:nvSpPr>
         <p:spPr>
           <a:xfrm>
-            <a:off x="1065401" y="5143851"/>
-            <a:ext cx="2281805" cy="1132513"/>
+            <a:off x="1486302" y="4760442"/>
+            <a:ext cx="1853967" cy="920167"/>
           </a:xfrm>
           <a:prstGeom prst="roundRect">
             <a:avLst/>
@@ -3434,7 +3075,7 @@
           <a:lstStyle/>
           <a:p>
             <a:pPr algn="ctr"/>
-            <a:endParaRPr lang="es-ES"/>
+            <a:endParaRPr lang="es-ES" sz="1463"/>
           </a:p>
         </p:txBody>
       </p:sp>
@@ -3451,9 +3092,9 @@
           <p:nvPr/>
         </p:nvSpPr>
         <p:spPr>
-          <a:xfrm rot="1813405">
-            <a:off x="7912029" y="833301"/>
-            <a:ext cx="2281805" cy="717279"/>
+          <a:xfrm rot="800363">
+            <a:off x="6419740" y="1695773"/>
+            <a:ext cx="1853967" cy="582789"/>
           </a:xfrm>
           <a:prstGeom prst="roundRect">
             <a:avLst/>
@@ -3488,7 +3129,7 @@
           <a:lstStyle/>
           <a:p>
             <a:pPr algn="ctr"/>
-            <a:endParaRPr lang="es-ES"/>
+            <a:endParaRPr lang="es-ES" sz="1463"/>
           </a:p>
         </p:txBody>
       </p:sp>
@@ -3505,9 +3146,9 @@
           <p:nvPr/>
         </p:nvSpPr>
         <p:spPr>
-          <a:xfrm rot="1813405">
-            <a:off x="7904373" y="5519058"/>
-            <a:ext cx="2281805" cy="747698"/>
+          <a:xfrm rot="2480146">
+            <a:off x="6397841" y="4886201"/>
+            <a:ext cx="1853967" cy="607505"/>
           </a:xfrm>
           <a:prstGeom prst="roundRect">
             <a:avLst/>
@@ -3542,7 +3183,7 @@
           <a:lstStyle/>
           <a:p>
             <a:pPr algn="ctr"/>
-            <a:endParaRPr lang="es-ES"/>
+            <a:endParaRPr lang="es-ES" sz="1463"/>
           </a:p>
         </p:txBody>
       </p:sp>
@@ -3560,8 +3201,8 @@
         </p:nvSpPr>
         <p:spPr>
           <a:xfrm>
-            <a:off x="841248" y="1088136"/>
-            <a:ext cx="9784080" cy="4910328"/>
+            <a:off x="1105994" y="1999399"/>
+            <a:ext cx="7430503" cy="3248647"/>
           </a:xfrm>
           <a:prstGeom prst="roundRect">
             <a:avLst>
@@ -3600,7 +3241,7 @@
           <a:lstStyle/>
           <a:p>
             <a:pPr algn="ctr"/>
-            <a:endParaRPr lang="es-ES"/>
+            <a:endParaRPr lang="es-ES" sz="1463" dirty="0"/>
           </a:p>
         </p:txBody>
       </p:sp>
@@ -3618,8 +3259,8 @@
         </p:nvSpPr>
         <p:spPr>
           <a:xfrm>
-            <a:off x="10506456" y="3209544"/>
-            <a:ext cx="621792" cy="685800"/>
+            <a:off x="8536495" y="3250692"/>
+            <a:ext cx="550061" cy="557213"/>
           </a:xfrm>
           <a:prstGeom prst="rect">
             <a:avLst/>
@@ -3646,7 +3287,7 @@
           <a:p>
             <a:pPr algn="ctr"/>
             <a:r>
-              <a:rPr lang="es-ES" sz="1600" dirty="0"/>
+              <a:rPr lang="es-ES" sz="1300" dirty="0"/>
               <a:t>Láser</a:t>
             </a:r>
           </a:p>
@@ -3666,8 +3307,8 @@
         </p:nvSpPr>
         <p:spPr>
           <a:xfrm>
-            <a:off x="4768558" y="3826764"/>
-            <a:ext cx="387907" cy="274320"/>
+            <a:off x="3874456" y="3752183"/>
+            <a:ext cx="315174" cy="222885"/>
           </a:xfrm>
           <a:prstGeom prst="rect">
             <a:avLst/>
@@ -3694,7 +3335,7 @@
           <a:p>
             <a:pPr algn="ctr"/>
             <a:r>
-              <a:rPr lang="es-ES" sz="1400" dirty="0"/>
+              <a:rPr lang="es-ES" sz="900" dirty="0"/>
               <a:t>A1</a:t>
             </a:r>
           </a:p>
@@ -3714,8 +3355,8 @@
         </p:nvSpPr>
         <p:spPr>
           <a:xfrm>
-            <a:off x="4764950" y="4435239"/>
-            <a:ext cx="387907" cy="274320"/>
+            <a:off x="3871524" y="4246569"/>
+            <a:ext cx="315174" cy="222885"/>
           </a:xfrm>
           <a:prstGeom prst="rect">
             <a:avLst/>
@@ -3742,7 +3383,7 @@
           <a:p>
             <a:pPr algn="ctr"/>
             <a:r>
-              <a:rPr lang="es-ES" sz="1400" dirty="0"/>
+              <a:rPr lang="es-ES" sz="900" dirty="0"/>
               <a:t>A2</a:t>
             </a:r>
           </a:p>
@@ -3762,8 +3403,8 @@
         </p:nvSpPr>
         <p:spPr>
           <a:xfrm>
-            <a:off x="8407670" y="4094952"/>
-            <a:ext cx="389059" cy="340287"/>
+            <a:off x="6831234" y="3970088"/>
+            <a:ext cx="316110" cy="276483"/>
           </a:xfrm>
           <a:prstGeom prst="rect">
             <a:avLst/>
@@ -3790,7 +3431,7 @@
           <a:p>
             <a:pPr algn="ctr"/>
             <a:r>
-              <a:rPr lang="es-ES" sz="1400" dirty="0"/>
+              <a:rPr lang="es-ES" sz="900" dirty="0"/>
               <a:t>A3</a:t>
             </a:r>
           </a:p>
@@ -3810,8 +3451,8 @@
         </p:nvSpPr>
         <p:spPr>
           <a:xfrm>
-            <a:off x="8409907" y="4655289"/>
-            <a:ext cx="389059" cy="340286"/>
+            <a:off x="6833052" y="4425360"/>
+            <a:ext cx="316110" cy="276482"/>
           </a:xfrm>
           <a:prstGeom prst="rect">
             <a:avLst/>
@@ -3838,7 +3479,7 @@
           <a:p>
             <a:pPr algn="ctr"/>
             <a:r>
-              <a:rPr lang="es-ES" sz="1400" dirty="0"/>
+              <a:rPr lang="es-ES" sz="900" dirty="0"/>
               <a:t>A4</a:t>
             </a:r>
           </a:p>
@@ -3858,8 +3499,8 @@
         </p:nvSpPr>
         <p:spPr>
           <a:xfrm>
-            <a:off x="1566672" y="4169664"/>
-            <a:ext cx="1777956" cy="905256"/>
+            <a:off x="1272921" y="4030789"/>
+            <a:ext cx="1444589" cy="735521"/>
           </a:xfrm>
           <a:prstGeom prst="rect">
             <a:avLst/>
@@ -3886,7 +3527,7 @@
           <a:p>
             <a:pPr algn="ctr"/>
             <a:r>
-              <a:rPr lang="es-ES" dirty="0"/>
+              <a:rPr lang="es-ES" sz="1463" dirty="0"/>
               <a:t>PC1</a:t>
             </a:r>
           </a:p>
@@ -3906,8 +3547,8 @@
         </p:nvSpPr>
         <p:spPr>
           <a:xfrm>
-            <a:off x="1310640" y="1517904"/>
-            <a:ext cx="839057" cy="320040"/>
+            <a:off x="1461165" y="2341839"/>
+            <a:ext cx="681734" cy="260033"/>
           </a:xfrm>
           <a:prstGeom prst="rect">
             <a:avLst/>
@@ -3934,7 +3575,7 @@
           <a:p>
             <a:pPr algn="ctr"/>
             <a:r>
-              <a:rPr lang="es-ES" dirty="0"/>
+              <a:rPr lang="es-ES" sz="1463" dirty="0"/>
               <a:t>DAQ</a:t>
             </a:r>
           </a:p>
@@ -3954,8 +3595,8 @@
         </p:nvSpPr>
         <p:spPr>
           <a:xfrm>
-            <a:off x="7633364" y="2255139"/>
-            <a:ext cx="1110576" cy="433756"/>
+            <a:off x="6202108" y="2475238"/>
+            <a:ext cx="902343" cy="352427"/>
           </a:xfrm>
           <a:prstGeom prst="rect">
             <a:avLst/>
@@ -3982,7 +3623,7 @@
           <a:p>
             <a:pPr algn="ctr"/>
             <a:r>
-              <a:rPr lang="es-ES" sz="1400" dirty="0"/>
+              <a:rPr lang="es-ES" sz="1138" dirty="0"/>
               <a:t>Motor Maxon</a:t>
             </a:r>
           </a:p>
@@ -4002,8 +3643,8 @@
         </p:nvSpPr>
         <p:spPr>
           <a:xfrm rot="16200000">
-            <a:off x="8602199" y="2782215"/>
-            <a:ext cx="573053" cy="253459"/>
+            <a:off x="7075667" y="2961585"/>
+            <a:ext cx="411593" cy="118747"/>
           </a:xfrm>
           <a:prstGeom prst="rect">
             <a:avLst/>
@@ -4030,7 +3671,7 @@
           <a:p>
             <a:pPr algn="ctr"/>
             <a:r>
-              <a:rPr lang="es-ES" sz="1400" dirty="0"/>
+              <a:rPr lang="es-ES" sz="800" dirty="0"/>
               <a:t>ENC1</a:t>
             </a:r>
           </a:p>
@@ -4050,8 +3691,8 @@
         </p:nvSpPr>
         <p:spPr>
           <a:xfrm>
-            <a:off x="7060311" y="2345287"/>
-            <a:ext cx="573053" cy="253459"/>
+            <a:off x="5696903" y="2548485"/>
+            <a:ext cx="505207" cy="205935"/>
           </a:xfrm>
           <a:prstGeom prst="rect">
             <a:avLst/>
@@ -4078,9 +3719,10 @@
           <a:p>
             <a:pPr algn="ctr"/>
             <a:r>
-              <a:rPr lang="es-ES" sz="1400" dirty="0"/>
+              <a:rPr lang="es-ES" sz="900" dirty="0"/>
               <a:t>ENC2</a:t>
             </a:r>
+            <a:endParaRPr lang="es-ES" sz="1138" dirty="0"/>
           </a:p>
         </p:txBody>
       </p:sp>
@@ -4098,8 +3740,8 @@
         </p:nvSpPr>
         <p:spPr>
           <a:xfrm rot="16200000">
-            <a:off x="9096305" y="3249100"/>
-            <a:ext cx="1110576" cy="433756"/>
+            <a:off x="7390748" y="3282831"/>
+            <a:ext cx="902343" cy="352427"/>
           </a:xfrm>
           <a:prstGeom prst="rect">
             <a:avLst/>
@@ -4126,7 +3768,7 @@
           <a:p>
             <a:pPr algn="ctr"/>
             <a:r>
-              <a:rPr lang="es-ES" sz="1400" dirty="0"/>
+              <a:rPr lang="es-ES" sz="1138" dirty="0"/>
               <a:t>Motor Principal</a:t>
             </a:r>
           </a:p>
@@ -4146,8 +3788,8 @@
         </p:nvSpPr>
         <p:spPr>
           <a:xfrm>
-            <a:off x="9365066" y="4033486"/>
-            <a:ext cx="573053" cy="253459"/>
+            <a:off x="7609118" y="3920147"/>
+            <a:ext cx="465606" cy="205935"/>
           </a:xfrm>
           <a:prstGeom prst="rect">
             <a:avLst/>
@@ -4174,7 +3816,7 @@
           <a:p>
             <a:pPr algn="ctr"/>
             <a:r>
-              <a:rPr lang="es-ES" sz="1400" dirty="0"/>
+              <a:rPr lang="es-ES" sz="1000" dirty="0"/>
               <a:t>ENC3</a:t>
             </a:r>
           </a:p>
@@ -4194,8 +3836,8 @@
         </p:nvSpPr>
         <p:spPr>
           <a:xfrm>
-            <a:off x="7790688" y="3044952"/>
-            <a:ext cx="468388" cy="352573"/>
+            <a:off x="5752617" y="3123527"/>
+            <a:ext cx="395916" cy="286466"/>
           </a:xfrm>
           <a:prstGeom prst="rect">
             <a:avLst/>
@@ -4222,8 +3864,8 @@
           <a:p>
             <a:pPr algn="ctr"/>
             <a:r>
-              <a:rPr lang="es-ES" sz="1400" dirty="0"/>
-              <a:t>PC3</a:t>
+              <a:rPr lang="es-ES" sz="900" dirty="0"/>
+              <a:t>PC2</a:t>
             </a:r>
           </a:p>
         </p:txBody>
@@ -4242,8 +3884,8 @@
         </p:nvSpPr>
         <p:spPr>
           <a:xfrm>
-            <a:off x="9045275" y="3483864"/>
-            <a:ext cx="113814" cy="74712"/>
+            <a:off x="7349286" y="3473577"/>
+            <a:ext cx="92474" cy="60704"/>
           </a:xfrm>
           <a:prstGeom prst="rect">
             <a:avLst/>
@@ -4269,7 +3911,7 @@
           <a:lstStyle/>
           <a:p>
             <a:pPr algn="ctr"/>
-            <a:endParaRPr lang="es-ES"/>
+            <a:endParaRPr lang="es-ES" sz="1463"/>
           </a:p>
         </p:txBody>
       </p:sp>
@@ -4287,8 +3929,8 @@
         </p:nvSpPr>
         <p:spPr>
           <a:xfrm>
-            <a:off x="9034781" y="3797694"/>
-            <a:ext cx="113814" cy="74712"/>
+            <a:off x="7340760" y="3728564"/>
+            <a:ext cx="92474" cy="60704"/>
           </a:xfrm>
           <a:prstGeom prst="rect">
             <a:avLst/>
@@ -4314,7 +3956,7 @@
           <a:lstStyle/>
           <a:p>
             <a:pPr algn="ctr"/>
-            <a:endParaRPr lang="es-ES"/>
+            <a:endParaRPr lang="es-ES" sz="1463"/>
           </a:p>
         </p:txBody>
       </p:sp>
@@ -4332,8 +3974,8 @@
         </p:nvSpPr>
         <p:spPr>
           <a:xfrm>
-            <a:off x="4093318" y="4692264"/>
-            <a:ext cx="113814" cy="74712"/>
+            <a:off x="3325821" y="4455402"/>
+            <a:ext cx="92474" cy="60704"/>
           </a:xfrm>
           <a:prstGeom prst="rect">
             <a:avLst/>
@@ -4359,7 +4001,7 @@
           <a:lstStyle/>
           <a:p>
             <a:pPr algn="ctr"/>
-            <a:endParaRPr lang="es-ES"/>
+            <a:endParaRPr lang="es-ES" sz="1463"/>
           </a:p>
         </p:txBody>
       </p:sp>
@@ -4377,8 +4019,8 @@
         </p:nvSpPr>
         <p:spPr>
           <a:xfrm>
-            <a:off x="4143419" y="4559034"/>
-            <a:ext cx="378630" cy="307777"/>
+            <a:off x="3366528" y="4347154"/>
+            <a:ext cx="341760" cy="267446"/>
           </a:xfrm>
           <a:prstGeom prst="rect">
             <a:avLst/>
@@ -4392,7 +4034,7 @@
           <a:lstStyle/>
           <a:p>
             <a:r>
-              <a:rPr lang="es-ES" sz="1400" dirty="0"/>
+              <a:rPr lang="es-ES" sz="1138" dirty="0"/>
               <a:t>V3</a:t>
             </a:r>
           </a:p>
@@ -4412,8 +4054,8 @@
         </p:nvSpPr>
         <p:spPr>
           <a:xfrm>
-            <a:off x="9094738" y="3329975"/>
-            <a:ext cx="378630" cy="307777"/>
+            <a:off x="7389475" y="3348544"/>
+            <a:ext cx="341760" cy="267446"/>
           </a:xfrm>
           <a:prstGeom prst="rect">
             <a:avLst/>
@@ -4427,7 +4069,7 @@
           <a:lstStyle/>
           <a:p>
             <a:r>
-              <a:rPr lang="es-ES" sz="1400" dirty="0"/>
+              <a:rPr lang="es-ES" sz="1138" dirty="0"/>
               <a:t>V2</a:t>
             </a:r>
           </a:p>
@@ -4447,8 +4089,8 @@
         </p:nvSpPr>
         <p:spPr>
           <a:xfrm>
-            <a:off x="9075412" y="3649972"/>
-            <a:ext cx="378630" cy="307777"/>
+            <a:off x="7373772" y="3608541"/>
+            <a:ext cx="341760" cy="267446"/>
           </a:xfrm>
           <a:prstGeom prst="rect">
             <a:avLst/>
@@ -4462,7 +4104,7 @@
           <a:lstStyle/>
           <a:p>
             <a:r>
-              <a:rPr lang="es-ES" sz="1400" dirty="0"/>
+              <a:rPr lang="es-ES" sz="1138" dirty="0"/>
               <a:t>V1</a:t>
             </a:r>
           </a:p>
@@ -4479,18 +4121,17 @@
           </p:cNvPr>
           <p:cNvCxnSpPr>
             <a:cxnSpLocks/>
+            <a:stCxn id="25" idx="3"/>
           </p:cNvCxnSpPr>
           <p:nvPr/>
         </p:nvCxnSpPr>
         <p:spPr>
           <a:xfrm>
-            <a:off x="3480765" y="1626244"/>
-            <a:ext cx="647717" cy="3080719"/>
-          </a:xfrm>
-          <a:prstGeom prst="bentConnector3">
-            <a:avLst>
-              <a:gd name="adj1" fmla="val 103646"/>
-            </a:avLst>
+            <a:off x="3240706" y="2465273"/>
+            <a:ext cx="113688" cy="2002072"/>
+          </a:xfrm>
+          <a:prstGeom prst="bentConnector2">
+            <a:avLst/>
           </a:prstGeom>
           <a:ln w="9525"/>
         </p:spPr>
@@ -4526,8 +4167,8 @@
         </p:nvCxnSpPr>
         <p:spPr>
           <a:xfrm flipV="1">
-            <a:off x="2149697" y="1666471"/>
-            <a:ext cx="1147002" cy="11453"/>
+            <a:off x="2142897" y="2462552"/>
+            <a:ext cx="931939" cy="9306"/>
           </a:xfrm>
           <a:prstGeom prst="line">
             <a:avLst/>
@@ -4566,8 +4207,8 @@
         </p:nvCxnSpPr>
         <p:spPr>
           <a:xfrm>
-            <a:off x="4150225" y="3521220"/>
-            <a:ext cx="4895050" cy="12700"/>
+            <a:off x="3372058" y="3503929"/>
+            <a:ext cx="3977228" cy="10319"/>
           </a:xfrm>
           <a:prstGeom prst="bentConnector3">
             <a:avLst>
@@ -4608,8 +4249,8 @@
         </p:nvCxnSpPr>
         <p:spPr>
           <a:xfrm>
-            <a:off x="8058521" y="3521220"/>
-            <a:ext cx="976260" cy="313830"/>
+            <a:off x="6547548" y="3503929"/>
+            <a:ext cx="793211" cy="254987"/>
           </a:xfrm>
           <a:prstGeom prst="bentConnector3">
             <a:avLst/>
@@ -4646,13 +4287,13 @@
           <p:nvPr/>
         </p:nvCxnSpPr>
         <p:spPr>
-          <a:xfrm>
-            <a:off x="1763211" y="1993624"/>
-            <a:ext cx="2790728" cy="2582388"/>
+          <a:xfrm rot="16200000" flipH="1">
+            <a:off x="2128439" y="2797212"/>
+            <a:ext cx="1606529" cy="1528844"/>
           </a:xfrm>
           <a:prstGeom prst="bentConnector3">
             <a:avLst>
-              <a:gd name="adj1" fmla="val 99529"/>
+              <a:gd name="adj1" fmla="val -99"/>
             </a:avLst>
           </a:prstGeom>
           <a:ln w="9525"/>
@@ -4689,8 +4330,8 @@
         </p:nvCxnSpPr>
         <p:spPr>
           <a:xfrm flipH="1">
-            <a:off x="4546760" y="3963924"/>
-            <a:ext cx="221798" cy="0"/>
+            <a:off x="3694242" y="3863626"/>
+            <a:ext cx="180211" cy="0"/>
           </a:xfrm>
           <a:prstGeom prst="line">
             <a:avLst/>
@@ -4728,8 +4369,8 @@
         </p:nvCxnSpPr>
         <p:spPr>
           <a:xfrm flipH="1" flipV="1">
-            <a:off x="4553939" y="4572398"/>
-            <a:ext cx="211011" cy="1"/>
+            <a:off x="3698091" y="4359010"/>
+            <a:ext cx="171446" cy="1"/>
           </a:xfrm>
           <a:prstGeom prst="line">
             <a:avLst/>
@@ -4765,8 +4406,8 @@
         </p:nvSpPr>
         <p:spPr>
           <a:xfrm>
-            <a:off x="2350008" y="1426464"/>
-            <a:ext cx="1145694" cy="411480"/>
+            <a:off x="2264106" y="2298109"/>
+            <a:ext cx="976600" cy="334328"/>
           </a:xfrm>
           <a:prstGeom prst="rect">
             <a:avLst/>
@@ -4793,7 +4434,7 @@
           <a:p>
             <a:pPr algn="ctr"/>
             <a:r>
-              <a:rPr lang="es-ES" sz="1600" dirty="0"/>
+              <a:rPr lang="es-ES" sz="1300" dirty="0"/>
               <a:t>Voltímetros</a:t>
             </a:r>
           </a:p>
@@ -4814,9 +4455,9 @@
           <p:nvPr/>
         </p:nvCxnSpPr>
         <p:spPr>
-          <a:xfrm rot="16200000" flipH="1">
-            <a:off x="1679094" y="1913977"/>
-            <a:ext cx="159296" cy="1"/>
+          <a:xfrm>
+            <a:off x="1692862" y="2599312"/>
+            <a:ext cx="516404" cy="157040"/>
           </a:xfrm>
           <a:prstGeom prst="bentConnector3">
             <a:avLst>
@@ -4857,12 +4498,12 @@
         </p:nvCxnSpPr>
         <p:spPr>
           <a:xfrm flipV="1">
-            <a:off x="3344628" y="3221239"/>
-            <a:ext cx="4446060" cy="1645572"/>
+            <a:off x="2705605" y="3266760"/>
+            <a:ext cx="3047012" cy="1392684"/>
           </a:xfrm>
           <a:prstGeom prst="bentConnector3">
             <a:avLst>
-              <a:gd name="adj1" fmla="val 81707"/>
+              <a:gd name="adj1" fmla="val 50000"/>
             </a:avLst>
           </a:prstGeom>
           <a:ln/>
@@ -4898,8 +4539,8 @@
         </p:nvCxnSpPr>
         <p:spPr>
           <a:xfrm rot="10800000">
-            <a:off x="8259076" y="3236655"/>
-            <a:ext cx="1083102" cy="892430"/>
+            <a:off x="6710499" y="3269736"/>
+            <a:ext cx="880020" cy="725099"/>
           </a:xfrm>
           <a:prstGeom prst="bentConnector3">
             <a:avLst>
@@ -4941,8 +4582,8 @@
         </p:nvCxnSpPr>
         <p:spPr>
           <a:xfrm rot="5400000">
-            <a:off x="8561017" y="2893530"/>
-            <a:ext cx="25768" cy="629650"/>
+            <a:off x="6694997" y="2680292"/>
+            <a:ext cx="40005" cy="1132931"/>
           </a:xfrm>
           <a:prstGeom prst="bentConnector2">
             <a:avLst/>
@@ -4982,8 +4623,8 @@
         </p:nvCxnSpPr>
         <p:spPr>
           <a:xfrm rot="16200000" flipH="1">
-            <a:off x="7462757" y="2482827"/>
-            <a:ext cx="446206" cy="678044"/>
+            <a:off x="5765488" y="2938439"/>
+            <a:ext cx="369107" cy="1068"/>
           </a:xfrm>
           <a:prstGeom prst="bentConnector3">
             <a:avLst/>
@@ -5022,12 +4663,12 @@
         </p:nvCxnSpPr>
         <p:spPr>
           <a:xfrm rot="10800000" flipV="1">
-            <a:off x="8888726" y="3552444"/>
-            <a:ext cx="1617730" cy="801442"/>
+            <a:off x="7209111" y="3529298"/>
+            <a:ext cx="1327384" cy="817855"/>
           </a:xfrm>
           <a:prstGeom prst="bentConnector3">
             <a:avLst>
-              <a:gd name="adj1" fmla="val 21997"/>
+              <a:gd name="adj1" fmla="val 26179"/>
             </a:avLst>
           </a:prstGeom>
           <a:ln w="9525"/>
@@ -5058,16 +4699,135 @@
           </p:cNvPr>
           <p:cNvCxnSpPr>
             <a:cxnSpLocks/>
-            <a:stCxn id="33" idx="3"/>
           </p:cNvCxnSpPr>
           <p:nvPr/>
         </p:nvCxnSpPr>
         <p:spPr>
           <a:xfrm>
-            <a:off x="8259076" y="3221239"/>
-            <a:ext cx="629650" cy="1132647"/>
-          </a:xfrm>
-          <a:prstGeom prst="bentConnector2">
+            <a:off x="6160437" y="3269742"/>
+            <a:ext cx="1081127" cy="1077411"/>
+          </a:xfrm>
+          <a:prstGeom prst="bentConnector3">
+            <a:avLst>
+              <a:gd name="adj1" fmla="val 50000"/>
+            </a:avLst>
+          </a:prstGeom>
+          <a:ln w="9525"/>
+        </p:spPr>
+        <p:style>
+          <a:lnRef idx="1">
+            <a:schemeClr val="dk1"/>
+          </a:lnRef>
+          <a:fillRef idx="0">
+            <a:schemeClr val="dk1"/>
+          </a:fillRef>
+          <a:effectRef idx="0">
+            <a:schemeClr val="dk1"/>
+          </a:effectRef>
+          <a:fontRef idx="minor">
+            <a:schemeClr val="tx1"/>
+          </a:fontRef>
+        </p:style>
+      </p:cxnSp>
+      <p:cxnSp>
+        <p:nvCxnSpPr>
+          <p:cNvPr id="13" name="Conector recto 12">
+            <a:extLst>
+              <a:ext uri="{FF2B5EF4-FFF2-40B4-BE49-F238E27FC236}">
+                <a16:creationId xmlns:a16="http://schemas.microsoft.com/office/drawing/2014/main" id="{6DE13532-B6A9-4BE9-B5E0-110CAE5CB163}"/>
+              </a:ext>
+            </a:extLst>
+          </p:cNvPr>
+          <p:cNvCxnSpPr>
+            <a:cxnSpLocks/>
+            <a:stCxn id="23" idx="1"/>
+          </p:cNvCxnSpPr>
+          <p:nvPr/>
+        </p:nvCxnSpPr>
+        <p:spPr>
+          <a:xfrm flipH="1" flipV="1">
+            <a:off x="3692763" y="4102011"/>
+            <a:ext cx="3138471" cy="6319"/>
+          </a:xfrm>
+          <a:prstGeom prst="line">
+            <a:avLst/>
+          </a:prstGeom>
+          <a:ln w="12700"/>
+        </p:spPr>
+        <p:style>
+          <a:lnRef idx="1">
+            <a:schemeClr val="dk1"/>
+          </a:lnRef>
+          <a:fillRef idx="0">
+            <a:schemeClr val="dk1"/>
+          </a:fillRef>
+          <a:effectRef idx="0">
+            <a:schemeClr val="dk1"/>
+          </a:effectRef>
+          <a:fontRef idx="minor">
+            <a:schemeClr val="tx1"/>
+          </a:fontRef>
+        </p:style>
+      </p:cxnSp>
+      <p:cxnSp>
+        <p:nvCxnSpPr>
+          <p:cNvPr id="17" name="Conector recto 16">
+            <a:extLst>
+              <a:ext uri="{FF2B5EF4-FFF2-40B4-BE49-F238E27FC236}">
+                <a16:creationId xmlns:a16="http://schemas.microsoft.com/office/drawing/2014/main" id="{44DABF12-C37B-4644-9AB3-D46FA11382B2}"/>
+              </a:ext>
+            </a:extLst>
+          </p:cNvPr>
+          <p:cNvCxnSpPr>
+            <a:cxnSpLocks/>
+            <a:stCxn id="24" idx="1"/>
+          </p:cNvCxnSpPr>
+          <p:nvPr/>
+        </p:nvCxnSpPr>
+        <p:spPr>
+          <a:xfrm flipH="1">
+            <a:off x="3698091" y="4563601"/>
+            <a:ext cx="3134961" cy="0"/>
+          </a:xfrm>
+          <a:prstGeom prst="line">
+            <a:avLst/>
+          </a:prstGeom>
+        </p:spPr>
+        <p:style>
+          <a:lnRef idx="1">
+            <a:schemeClr val="dk1"/>
+          </a:lnRef>
+          <a:fillRef idx="0">
+            <a:schemeClr val="dk1"/>
+          </a:fillRef>
+          <a:effectRef idx="0">
+            <a:schemeClr val="dk1"/>
+          </a:effectRef>
+          <a:fontRef idx="minor">
+            <a:schemeClr val="tx1"/>
+          </a:fontRef>
+        </p:style>
+      </p:cxnSp>
+      <p:cxnSp>
+        <p:nvCxnSpPr>
+          <p:cNvPr id="40" name="Conector recto 39">
+            <a:extLst>
+              <a:ext uri="{FF2B5EF4-FFF2-40B4-BE49-F238E27FC236}">
+                <a16:creationId xmlns:a16="http://schemas.microsoft.com/office/drawing/2014/main" id="{9F322534-D398-488B-A732-24C5FDB9A800}"/>
+              </a:ext>
+            </a:extLst>
+          </p:cNvPr>
+          <p:cNvCxnSpPr>
+            <a:cxnSpLocks/>
+          </p:cNvCxnSpPr>
+          <p:nvPr/>
+        </p:nvCxnSpPr>
+        <p:spPr>
+          <a:xfrm flipH="1">
+            <a:off x="3696930" y="4357099"/>
+            <a:ext cx="453" cy="206502"/>
+          </a:xfrm>
+          <a:prstGeom prst="line">
             <a:avLst/>
           </a:prstGeom>
           <a:ln w="9525"/>
@@ -5081,6 +4841,729 @@
           </a:fillRef>
           <a:effectRef idx="0">
             <a:schemeClr val="dk1"/>
+          </a:effectRef>
+          <a:fontRef idx="minor">
+            <a:schemeClr val="tx1"/>
+          </a:fontRef>
+        </p:style>
+      </p:cxnSp>
+      <p:sp>
+        <p:nvSpPr>
+          <p:cNvPr id="61" name="Encoder Incremental">
+            <a:extLst>
+              <a:ext uri="{FF2B5EF4-FFF2-40B4-BE49-F238E27FC236}">
+                <a16:creationId xmlns:a16="http://schemas.microsoft.com/office/drawing/2014/main" id="{4C78F707-1805-45E3-89A6-20D05F36A43A}"/>
+              </a:ext>
+            </a:extLst>
+          </p:cNvPr>
+          <p:cNvSpPr/>
+          <p:nvPr/>
+        </p:nvSpPr>
+        <p:spPr>
+          <a:xfrm>
+            <a:off x="6377519" y="3022135"/>
+            <a:ext cx="556054" cy="205935"/>
+          </a:xfrm>
+          <a:prstGeom prst="rect">
+            <a:avLst/>
+          </a:prstGeom>
+          <a:ln w="28575"/>
+        </p:spPr>
+        <p:style>
+          <a:lnRef idx="2">
+            <a:schemeClr val="dk1"/>
+          </a:lnRef>
+          <a:fillRef idx="1">
+            <a:schemeClr val="lt1"/>
+          </a:fillRef>
+          <a:effectRef idx="0">
+            <a:schemeClr val="dk1"/>
+          </a:effectRef>
+          <a:fontRef idx="minor">
+            <a:schemeClr val="dk1"/>
+          </a:fontRef>
+        </p:style>
+        <p:txBody>
+          <a:bodyPr rtlCol="0" anchor="ctr"/>
+          <a:lstStyle/>
+          <a:p>
+            <a:pPr algn="ctr"/>
+            <a:r>
+              <a:rPr lang="es-ES" sz="1138" dirty="0"/>
+              <a:t>Polulu</a:t>
+            </a:r>
+          </a:p>
+        </p:txBody>
+      </p:sp>
+      <p:cxnSp>
+        <p:nvCxnSpPr>
+          <p:cNvPr id="53" name="Conector recto 52">
+            <a:extLst>
+              <a:ext uri="{FF2B5EF4-FFF2-40B4-BE49-F238E27FC236}">
+                <a16:creationId xmlns:a16="http://schemas.microsoft.com/office/drawing/2014/main" id="{E5D94CE6-7CAD-49DB-B984-BD609E8AF7FB}"/>
+              </a:ext>
+            </a:extLst>
+          </p:cNvPr>
+          <p:cNvCxnSpPr>
+            <a:cxnSpLocks/>
+          </p:cNvCxnSpPr>
+          <p:nvPr/>
+        </p:nvCxnSpPr>
+        <p:spPr>
+          <a:xfrm>
+            <a:off x="7434669" y="1999396"/>
+            <a:ext cx="7939" cy="3248650"/>
+          </a:xfrm>
+          <a:prstGeom prst="line">
+            <a:avLst/>
+          </a:prstGeom>
+          <a:ln w="9525" cap="flat" cmpd="sng" algn="ctr">
+            <a:solidFill>
+              <a:schemeClr val="accent1"/>
+            </a:solidFill>
+            <a:prstDash val="dash"/>
+            <a:round/>
+            <a:headEnd type="none" w="med" len="med"/>
+            <a:tailEnd type="none" w="med" len="med"/>
+          </a:ln>
+        </p:spPr>
+        <p:style>
+          <a:lnRef idx="0">
+            <a:scrgbClr r="0" g="0" b="0"/>
+          </a:lnRef>
+          <a:fillRef idx="0">
+            <a:scrgbClr r="0" g="0" b="0"/>
+          </a:fillRef>
+          <a:effectRef idx="0">
+            <a:scrgbClr r="0" g="0" b="0"/>
+          </a:effectRef>
+          <a:fontRef idx="minor">
+            <a:schemeClr val="tx1"/>
+          </a:fontRef>
+        </p:style>
+      </p:cxnSp>
+      <p:cxnSp>
+        <p:nvCxnSpPr>
+          <p:cNvPr id="57" name="Conector recto 56">
+            <a:extLst>
+              <a:ext uri="{FF2B5EF4-FFF2-40B4-BE49-F238E27FC236}">
+                <a16:creationId xmlns:a16="http://schemas.microsoft.com/office/drawing/2014/main" id="{C1D31C2A-7BFD-4945-9F1E-06F649E7B2B0}"/>
+              </a:ext>
+            </a:extLst>
+          </p:cNvPr>
+          <p:cNvCxnSpPr>
+            <a:cxnSpLocks/>
+          </p:cNvCxnSpPr>
+          <p:nvPr/>
+        </p:nvCxnSpPr>
+        <p:spPr>
+          <a:xfrm>
+            <a:off x="2413285" y="963338"/>
+            <a:ext cx="5029977" cy="1036056"/>
+          </a:xfrm>
+          <a:prstGeom prst="line">
+            <a:avLst/>
+          </a:prstGeom>
+        </p:spPr>
+        <p:style>
+          <a:lnRef idx="1">
+            <a:schemeClr val="accent1"/>
+          </a:lnRef>
+          <a:fillRef idx="0">
+            <a:schemeClr val="accent1"/>
+          </a:fillRef>
+          <a:effectRef idx="0">
+            <a:schemeClr val="accent1"/>
+          </a:effectRef>
+          <a:fontRef idx="minor">
+            <a:schemeClr val="tx1"/>
+          </a:fontRef>
+        </p:style>
+      </p:cxnSp>
+      <p:cxnSp>
+        <p:nvCxnSpPr>
+          <p:cNvPr id="63" name="Conector recto 62">
+            <a:extLst>
+              <a:ext uri="{FF2B5EF4-FFF2-40B4-BE49-F238E27FC236}">
+                <a16:creationId xmlns:a16="http://schemas.microsoft.com/office/drawing/2014/main" id="{6810A644-A73B-42B1-958D-4F1EC686B43C}"/>
+              </a:ext>
+            </a:extLst>
+          </p:cNvPr>
+          <p:cNvCxnSpPr>
+            <a:cxnSpLocks/>
+          </p:cNvCxnSpPr>
+          <p:nvPr/>
+        </p:nvCxnSpPr>
+        <p:spPr>
+          <a:xfrm>
+            <a:off x="2410639" y="963338"/>
+            <a:ext cx="5031258" cy="4284706"/>
+          </a:xfrm>
+          <a:prstGeom prst="line">
+            <a:avLst/>
+          </a:prstGeom>
+        </p:spPr>
+        <p:style>
+          <a:lnRef idx="1">
+            <a:schemeClr val="accent1"/>
+          </a:lnRef>
+          <a:fillRef idx="0">
+            <a:schemeClr val="accent1"/>
+          </a:fillRef>
+          <a:effectRef idx="0">
+            <a:schemeClr val="accent1"/>
+          </a:effectRef>
+          <a:fontRef idx="minor">
+            <a:schemeClr val="tx1"/>
+          </a:fontRef>
+        </p:style>
+      </p:cxnSp>
+      <p:sp>
+        <p:nvSpPr>
+          <p:cNvPr id="73" name="Rectángulo 72">
+            <a:extLst>
+              <a:ext uri="{FF2B5EF4-FFF2-40B4-BE49-F238E27FC236}">
+                <a16:creationId xmlns:a16="http://schemas.microsoft.com/office/drawing/2014/main" id="{EA95CD0F-E7B5-464E-A59F-11D7616BEF95}"/>
+              </a:ext>
+            </a:extLst>
+          </p:cNvPr>
+          <p:cNvSpPr/>
+          <p:nvPr/>
+        </p:nvSpPr>
+        <p:spPr>
+          <a:xfrm>
+            <a:off x="7104451" y="2601872"/>
+            <a:ext cx="340527" cy="56101"/>
+          </a:xfrm>
+          <a:prstGeom prst="rect">
+            <a:avLst/>
+          </a:prstGeom>
+          <a:ln>
+            <a:noFill/>
+          </a:ln>
+        </p:spPr>
+        <p:style>
+          <a:lnRef idx="2">
+            <a:schemeClr val="accent1">
+              <a:shade val="50000"/>
+            </a:schemeClr>
+          </a:lnRef>
+          <a:fillRef idx="1">
+            <a:schemeClr val="accent1"/>
+          </a:fillRef>
+          <a:effectRef idx="0">
+            <a:schemeClr val="accent1"/>
+          </a:effectRef>
+          <a:fontRef idx="minor">
+            <a:schemeClr val="lt1"/>
+          </a:fontRef>
+        </p:style>
+        <p:txBody>
+          <a:bodyPr rot="0" spcFirstLastPara="0" vertOverflow="overflow" horzOverflow="overflow" vert="horz" wrap="square" lIns="74295" tIns="37148" rIns="74295" bIns="37148" numCol="1" spcCol="0" rtlCol="0" fromWordArt="0" anchor="ctr" anchorCtr="0" forceAA="0" compatLnSpc="1">
+            <a:prstTxWarp prst="textNoShape">
+              <a:avLst/>
+            </a:prstTxWarp>
+            <a:noAutofit/>
+          </a:bodyPr>
+          <a:lstStyle/>
+          <a:p>
+            <a:pPr algn="ctr"/>
+            <a:endParaRPr lang="es-ES" sz="1463"/>
+          </a:p>
+        </p:txBody>
+      </p:sp>
+      <p:cxnSp>
+        <p:nvCxnSpPr>
+          <p:cNvPr id="75" name="Conector recto 74">
+            <a:extLst>
+              <a:ext uri="{FF2B5EF4-FFF2-40B4-BE49-F238E27FC236}">
+                <a16:creationId xmlns:a16="http://schemas.microsoft.com/office/drawing/2014/main" id="{859D60EB-241F-4536-B91B-33B6E560BEF2}"/>
+              </a:ext>
+            </a:extLst>
+          </p:cNvPr>
+          <p:cNvCxnSpPr>
+            <a:cxnSpLocks/>
+          </p:cNvCxnSpPr>
+          <p:nvPr/>
+        </p:nvCxnSpPr>
+        <p:spPr>
+          <a:xfrm flipH="1">
+            <a:off x="7274482" y="2656036"/>
+            <a:ext cx="235" cy="157191"/>
+          </a:xfrm>
+          <a:prstGeom prst="line">
+            <a:avLst/>
+          </a:prstGeom>
+        </p:spPr>
+        <p:style>
+          <a:lnRef idx="1">
+            <a:schemeClr val="dk1"/>
+          </a:lnRef>
+          <a:fillRef idx="0">
+            <a:schemeClr val="dk1"/>
+          </a:fillRef>
+          <a:effectRef idx="0">
+            <a:schemeClr val="dk1"/>
+          </a:effectRef>
+          <a:fontRef idx="minor">
+            <a:schemeClr val="tx1"/>
+          </a:fontRef>
+        </p:style>
+      </p:cxnSp>
+      <p:cxnSp>
+        <p:nvCxnSpPr>
+          <p:cNvPr id="81" name="Conector recto 80">
+            <a:extLst>
+              <a:ext uri="{FF2B5EF4-FFF2-40B4-BE49-F238E27FC236}">
+                <a16:creationId xmlns:a16="http://schemas.microsoft.com/office/drawing/2014/main" id="{C00B1E00-EF1E-40D9-AC88-B9C65F12A228}"/>
+              </a:ext>
+            </a:extLst>
+          </p:cNvPr>
+          <p:cNvCxnSpPr>
+            <a:cxnSpLocks/>
+            <a:stCxn id="61" idx="1"/>
+            <a:endCxn id="33" idx="0"/>
+          </p:cNvCxnSpPr>
+          <p:nvPr/>
+        </p:nvCxnSpPr>
+        <p:spPr>
+          <a:xfrm flipH="1" flipV="1">
+            <a:off x="5950575" y="3123527"/>
+            <a:ext cx="426944" cy="1576"/>
+          </a:xfrm>
+          <a:prstGeom prst="line">
+            <a:avLst/>
+          </a:prstGeom>
+          <a:ln w="9525"/>
+        </p:spPr>
+        <p:style>
+          <a:lnRef idx="1">
+            <a:schemeClr val="dk1"/>
+          </a:lnRef>
+          <a:fillRef idx="0">
+            <a:schemeClr val="dk1"/>
+          </a:fillRef>
+          <a:effectRef idx="0">
+            <a:schemeClr val="dk1"/>
+          </a:effectRef>
+          <a:fontRef idx="minor">
+            <a:schemeClr val="tx1"/>
+          </a:fontRef>
+        </p:style>
+      </p:cxnSp>
+      <p:cxnSp>
+        <p:nvCxnSpPr>
+          <p:cNvPr id="85" name="Conector recto 84">
+            <a:extLst>
+              <a:ext uri="{FF2B5EF4-FFF2-40B4-BE49-F238E27FC236}">
+                <a16:creationId xmlns:a16="http://schemas.microsoft.com/office/drawing/2014/main" id="{064D69E2-4E0E-4FB1-8F3F-968EBF8553EA}"/>
+              </a:ext>
+            </a:extLst>
+          </p:cNvPr>
+          <p:cNvCxnSpPr>
+            <a:cxnSpLocks/>
+            <a:stCxn id="61" idx="0"/>
+            <a:endCxn id="28" idx="2"/>
+          </p:cNvCxnSpPr>
+          <p:nvPr/>
+        </p:nvCxnSpPr>
+        <p:spPr>
+          <a:xfrm flipH="1" flipV="1">
+            <a:off x="6653282" y="2827667"/>
+            <a:ext cx="2266" cy="194468"/>
+          </a:xfrm>
+          <a:prstGeom prst="line">
+            <a:avLst/>
+          </a:prstGeom>
+          <a:ln w="9525"/>
+        </p:spPr>
+        <p:style>
+          <a:lnRef idx="1">
+            <a:schemeClr val="dk1"/>
+          </a:lnRef>
+          <a:fillRef idx="0">
+            <a:schemeClr val="dk1"/>
+          </a:fillRef>
+          <a:effectRef idx="0">
+            <a:schemeClr val="dk1"/>
+          </a:effectRef>
+          <a:fontRef idx="minor">
+            <a:schemeClr val="tx1"/>
+          </a:fontRef>
+        </p:style>
+      </p:cxnSp>
+      <p:cxnSp>
+        <p:nvCxnSpPr>
+          <p:cNvPr id="94" name="Conector: curvado 93">
+            <a:extLst>
+              <a:ext uri="{FF2B5EF4-FFF2-40B4-BE49-F238E27FC236}">
+                <a16:creationId xmlns:a16="http://schemas.microsoft.com/office/drawing/2014/main" id="{B9E3569D-3B2B-405A-B113-413B94AA1AB2}"/>
+              </a:ext>
+            </a:extLst>
+          </p:cNvPr>
+          <p:cNvCxnSpPr>
+            <a:cxnSpLocks/>
+          </p:cNvCxnSpPr>
+          <p:nvPr/>
+        </p:nvCxnSpPr>
+        <p:spPr>
+          <a:xfrm rot="16200000" flipH="1">
+            <a:off x="7290035" y="2715388"/>
+            <a:ext cx="147964" cy="138435"/>
+          </a:xfrm>
+          <a:prstGeom prst="curvedConnector3">
+            <a:avLst>
+              <a:gd name="adj1" fmla="val -190597"/>
+            </a:avLst>
+          </a:prstGeom>
+          <a:ln>
+            <a:tailEnd type="triangle"/>
+          </a:ln>
+        </p:spPr>
+        <p:style>
+          <a:lnRef idx="1">
+            <a:schemeClr val="dk1"/>
+          </a:lnRef>
+          <a:fillRef idx="0">
+            <a:schemeClr val="dk1"/>
+          </a:fillRef>
+          <a:effectRef idx="0">
+            <a:schemeClr val="dk1"/>
+          </a:effectRef>
+          <a:fontRef idx="minor">
+            <a:schemeClr val="tx1"/>
+          </a:fontRef>
+        </p:style>
+      </p:cxnSp>
+      <p:sp>
+        <p:nvSpPr>
+          <p:cNvPr id="116" name="Rectángulo 115">
+            <a:extLst>
+              <a:ext uri="{FF2B5EF4-FFF2-40B4-BE49-F238E27FC236}">
+                <a16:creationId xmlns:a16="http://schemas.microsoft.com/office/drawing/2014/main" id="{74420492-8403-42C8-A4C6-D108EC39CD3C}"/>
+              </a:ext>
+            </a:extLst>
+          </p:cNvPr>
+          <p:cNvSpPr/>
+          <p:nvPr/>
+        </p:nvSpPr>
+        <p:spPr>
+          <a:xfrm>
+            <a:off x="7108476" y="2598475"/>
+            <a:ext cx="204761" cy="55372"/>
+          </a:xfrm>
+          <a:prstGeom prst="rect">
+            <a:avLst/>
+          </a:prstGeom>
+          <a:ln>
+            <a:noFill/>
+          </a:ln>
+        </p:spPr>
+        <p:style>
+          <a:lnRef idx="2">
+            <a:schemeClr val="accent1">
+              <a:shade val="50000"/>
+            </a:schemeClr>
+          </a:lnRef>
+          <a:fillRef idx="1">
+            <a:schemeClr val="accent1"/>
+          </a:fillRef>
+          <a:effectRef idx="0">
+            <a:schemeClr val="accent1"/>
+          </a:effectRef>
+          <a:fontRef idx="minor">
+            <a:schemeClr val="lt1"/>
+          </a:fontRef>
+        </p:style>
+        <p:txBody>
+          <a:bodyPr rot="0" spcFirstLastPara="0" vertOverflow="overflow" horzOverflow="overflow" vert="horz" wrap="square" lIns="74295" tIns="37148" rIns="74295" bIns="37148" numCol="1" spcCol="0" rtlCol="0" fromWordArt="0" anchor="ctr" anchorCtr="0" forceAA="0" compatLnSpc="1">
+            <a:prstTxWarp prst="textNoShape">
+              <a:avLst/>
+            </a:prstTxWarp>
+            <a:noAutofit/>
+          </a:bodyPr>
+          <a:lstStyle/>
+          <a:p>
+            <a:pPr algn="ctr"/>
+            <a:endParaRPr lang="es-ES" sz="1463"/>
+          </a:p>
+        </p:txBody>
+      </p:sp>
+      <mc:AlternateContent xmlns:mc="http://schemas.openxmlformats.org/markup-compatibility/2006">
+        <mc:Choice xmlns:a14="http://schemas.microsoft.com/office/drawing/2010/main" Requires="a14">
+          <p:sp>
+            <p:nvSpPr>
+              <p:cNvPr id="127" name="CuadroTexto 126">
+                <a:extLst>
+                  <a:ext uri="{FF2B5EF4-FFF2-40B4-BE49-F238E27FC236}">
+                    <a16:creationId xmlns:a16="http://schemas.microsoft.com/office/drawing/2014/main" id="{7591F9C1-8E4C-4AD7-AFDB-AFF98FC8635B}"/>
+                  </a:ext>
+                </a:extLst>
+              </p:cNvPr>
+              <p:cNvSpPr txBox="1"/>
+              <p:nvPr/>
+            </p:nvSpPr>
+            <p:spPr>
+              <a:xfrm>
+                <a:off x="7159291" y="2365089"/>
+                <a:ext cx="152991" cy="225126"/>
+              </a:xfrm>
+              <a:prstGeom prst="rect">
+                <a:avLst/>
+              </a:prstGeom>
+              <a:noFill/>
+            </p:spPr>
+            <p:txBody>
+              <a:bodyPr wrap="none" lIns="0" tIns="0" rIns="0" bIns="0" rtlCol="0">
+                <a:spAutoFit/>
+              </a:bodyPr>
+              <a:lstStyle/>
+              <a:p>
+                <a14:m>
+                  <m:oMathPara xmlns:m="http://schemas.openxmlformats.org/officeDocument/2006/math">
+                    <m:oMathParaPr>
+                      <m:jc m:val="centerGroup"/>
+                    </m:oMathParaPr>
+                    <m:oMath xmlns:m="http://schemas.openxmlformats.org/officeDocument/2006/math">
+                      <m:r>
+                        <a:rPr lang="es-ES" sz="1463" i="1">
+                          <a:latin typeface="Cambria Math" panose="02040503050406030204" pitchFamily="18" charset="0"/>
+                          <a:ea typeface="Cambria Math" panose="02040503050406030204" pitchFamily="18" charset="0"/>
+                        </a:rPr>
+                        <m:t>𝜃</m:t>
+                      </m:r>
+                    </m:oMath>
+                  </m:oMathPara>
+                </a14:m>
+                <a:endParaRPr lang="es-ES" sz="1463" dirty="0"/>
+              </a:p>
+            </p:txBody>
+          </p:sp>
+        </mc:Choice>
+        <mc:Fallback>
+          <p:sp>
+            <p:nvSpPr>
+              <p:cNvPr id="127" name="CuadroTexto 126">
+                <a:extLst>
+                  <a:ext uri="{FF2B5EF4-FFF2-40B4-BE49-F238E27FC236}">
+                    <a16:creationId xmlns:a16="http://schemas.microsoft.com/office/drawing/2014/main" id="{7591F9C1-8E4C-4AD7-AFDB-AFF98FC8635B}"/>
+                  </a:ext>
+                </a:extLst>
+              </p:cNvPr>
+              <p:cNvSpPr txBox="1">
+                <a:spLocks noRot="1" noChangeAspect="1" noMove="1" noResize="1" noEditPoints="1" noAdjustHandles="1" noChangeArrowheads="1" noChangeShapeType="1" noTextEdit="1"/>
+              </p:cNvSpPr>
+              <p:nvPr/>
+            </p:nvSpPr>
+            <p:spPr>
+              <a:xfrm>
+                <a:off x="7159291" y="2365089"/>
+                <a:ext cx="152991" cy="225126"/>
+              </a:xfrm>
+              <a:prstGeom prst="rect">
+                <a:avLst/>
+              </a:prstGeom>
+              <a:blipFill>
+                <a:blip r:embed="rId2"/>
+                <a:stretch>
+                  <a:fillRect l="-30769" r="-19231" b="-8108"/>
+                </a:stretch>
+              </a:blipFill>
+            </p:spPr>
+            <p:txBody>
+              <a:bodyPr/>
+              <a:lstStyle/>
+              <a:p>
+                <a:r>
+                  <a:rPr lang="es-ES">
+                    <a:noFill/>
+                  </a:rPr>
+                  <a:t> </a:t>
+                </a:r>
+              </a:p>
+            </p:txBody>
+          </p:sp>
+        </mc:Fallback>
+      </mc:AlternateContent>
+      <p:sp>
+        <p:nvSpPr>
+          <p:cNvPr id="152" name="Arco 151">
+            <a:extLst>
+              <a:ext uri="{FF2B5EF4-FFF2-40B4-BE49-F238E27FC236}">
+                <a16:creationId xmlns:a16="http://schemas.microsoft.com/office/drawing/2014/main" id="{236113D5-767F-4946-B437-737969366D2E}"/>
+              </a:ext>
+            </a:extLst>
+          </p:cNvPr>
+          <p:cNvSpPr/>
+          <p:nvPr/>
+        </p:nvSpPr>
+        <p:spPr>
+          <a:xfrm rot="3386703">
+            <a:off x="2305687" y="826641"/>
+            <a:ext cx="424477" cy="304054"/>
+          </a:xfrm>
+          <a:prstGeom prst="arc">
+            <a:avLst>
+              <a:gd name="adj1" fmla="val 19034878"/>
+              <a:gd name="adj2" fmla="val 0"/>
+            </a:avLst>
+          </a:prstGeom>
+        </p:spPr>
+        <p:style>
+          <a:lnRef idx="1">
+            <a:schemeClr val="accent1"/>
+          </a:lnRef>
+          <a:fillRef idx="0">
+            <a:schemeClr val="accent1"/>
+          </a:fillRef>
+          <a:effectRef idx="0">
+            <a:schemeClr val="accent1"/>
+          </a:effectRef>
+          <a:fontRef idx="minor">
+            <a:schemeClr val="tx1"/>
+          </a:fontRef>
+        </p:style>
+        <p:txBody>
+          <a:bodyPr rtlCol="0" anchor="ctr"/>
+          <a:lstStyle/>
+          <a:p>
+            <a:pPr algn="ctr"/>
+            <a:endParaRPr lang="es-ES"/>
+          </a:p>
+        </p:txBody>
+      </p:sp>
+      <mc:AlternateContent xmlns:mc="http://schemas.openxmlformats.org/markup-compatibility/2006">
+        <mc:Choice xmlns:a14="http://schemas.microsoft.com/office/drawing/2010/main" Requires="a14">
+          <p:sp>
+            <p:nvSpPr>
+              <p:cNvPr id="153" name="CuadroTexto 152">
+                <a:extLst>
+                  <a:ext uri="{FF2B5EF4-FFF2-40B4-BE49-F238E27FC236}">
+                    <a16:creationId xmlns:a16="http://schemas.microsoft.com/office/drawing/2014/main" id="{48694F3B-3E06-4B55-A156-FDE4A0477028}"/>
+                  </a:ext>
+                </a:extLst>
+              </p:cNvPr>
+              <p:cNvSpPr txBox="1"/>
+              <p:nvPr/>
+            </p:nvSpPr>
+            <p:spPr>
+              <a:xfrm>
+                <a:off x="2660599" y="1019306"/>
+                <a:ext cx="143244" cy="215444"/>
+              </a:xfrm>
+              <a:prstGeom prst="rect">
+                <a:avLst/>
+              </a:prstGeom>
+              <a:noFill/>
+            </p:spPr>
+            <p:txBody>
+              <a:bodyPr wrap="none" lIns="0" tIns="0" rIns="0" bIns="0" rtlCol="0">
+                <a:spAutoFit/>
+              </a:bodyPr>
+              <a:lstStyle/>
+              <a:p>
+                <a14:m>
+                  <m:oMathPara xmlns:m="http://schemas.openxmlformats.org/officeDocument/2006/math">
+                    <m:oMathParaPr>
+                      <m:jc m:val="centerGroup"/>
+                    </m:oMathParaPr>
+                    <m:oMath xmlns:m="http://schemas.openxmlformats.org/officeDocument/2006/math">
+                      <m:r>
+                        <a:rPr lang="es-ES" sz="1400" i="1" smtClean="0">
+                          <a:latin typeface="Cambria Math" panose="02040503050406030204" pitchFamily="18" charset="0"/>
+                          <a:ea typeface="Cambria Math" panose="02040503050406030204" pitchFamily="18" charset="0"/>
+                        </a:rPr>
+                        <m:t>𝛿</m:t>
+                      </m:r>
+                    </m:oMath>
+                  </m:oMathPara>
+                </a14:m>
+                <a:endParaRPr lang="es-ES" dirty="0"/>
+              </a:p>
+            </p:txBody>
+          </p:sp>
+        </mc:Choice>
+        <mc:Fallback>
+          <p:sp>
+            <p:nvSpPr>
+              <p:cNvPr id="153" name="CuadroTexto 152">
+                <a:extLst>
+                  <a:ext uri="{FF2B5EF4-FFF2-40B4-BE49-F238E27FC236}">
+                    <a16:creationId xmlns:a16="http://schemas.microsoft.com/office/drawing/2014/main" id="{48694F3B-3E06-4B55-A156-FDE4A0477028}"/>
+                  </a:ext>
+                </a:extLst>
+              </p:cNvPr>
+              <p:cNvSpPr txBox="1">
+                <a:spLocks noRot="1" noChangeAspect="1" noMove="1" noResize="1" noEditPoints="1" noAdjustHandles="1" noChangeArrowheads="1" noChangeShapeType="1" noTextEdit="1"/>
+              </p:cNvSpPr>
+              <p:nvPr/>
+            </p:nvSpPr>
+            <p:spPr>
+              <a:xfrm>
+                <a:off x="2660599" y="1019306"/>
+                <a:ext cx="143244" cy="215444"/>
+              </a:xfrm>
+              <a:prstGeom prst="rect">
+                <a:avLst/>
+              </a:prstGeom>
+              <a:blipFill>
+                <a:blip r:embed="rId3"/>
+                <a:stretch>
+                  <a:fillRect l="-29167" r="-25000" b="-5556"/>
+                </a:stretch>
+              </a:blipFill>
+            </p:spPr>
+            <p:txBody>
+              <a:bodyPr/>
+              <a:lstStyle/>
+              <a:p>
+                <a:r>
+                  <a:rPr lang="es-ES">
+                    <a:noFill/>
+                  </a:rPr>
+                  <a:t> </a:t>
+                </a:r>
+              </a:p>
+            </p:txBody>
+          </p:sp>
+        </mc:Fallback>
+      </mc:AlternateContent>
+      <p:cxnSp>
+        <p:nvCxnSpPr>
+          <p:cNvPr id="155" name="Conector recto 154">
+            <a:extLst>
+              <a:ext uri="{FF2B5EF4-FFF2-40B4-BE49-F238E27FC236}">
+                <a16:creationId xmlns:a16="http://schemas.microsoft.com/office/drawing/2014/main" id="{DEE60170-3E60-4480-980B-49D933DD8791}"/>
+              </a:ext>
+            </a:extLst>
+          </p:cNvPr>
+          <p:cNvCxnSpPr>
+            <a:cxnSpLocks/>
+            <a:stCxn id="8" idx="2"/>
+          </p:cNvCxnSpPr>
+          <p:nvPr/>
+        </p:nvCxnSpPr>
+        <p:spPr>
+          <a:xfrm flipV="1">
+            <a:off x="2413286" y="963338"/>
+            <a:ext cx="0" cy="4717271"/>
+          </a:xfrm>
+          <a:prstGeom prst="line">
+            <a:avLst/>
+          </a:prstGeom>
+          <a:ln w="12700">
+            <a:prstDash val="dash"/>
+          </a:ln>
+        </p:spPr>
+        <p:style>
+          <a:lnRef idx="1">
+            <a:schemeClr val="accent1"/>
+          </a:lnRef>
+          <a:fillRef idx="0">
+            <a:schemeClr val="accent1"/>
+          </a:fillRef>
+          <a:effectRef idx="0">
+            <a:schemeClr val="accent1"/>
           </a:effectRef>
           <a:fontRef idx="minor">
             <a:schemeClr val="tx1"/>
@@ -5103,7 +5586,7 @@
 <file path=ppt/theme/theme1.xml><?xml version="1.0" encoding="utf-8"?>
 <a:theme xmlns:a="http://schemas.openxmlformats.org/drawingml/2006/main" name="Tema de Office">
   <a:themeElements>
-    <a:clrScheme name="Office">
+    <a:clrScheme name="Tema de Office">
       <a:dk1>
         <a:sysClr val="windowText" lastClr="000000"/>
       </a:dk1>
@@ -5141,7 +5624,7 @@
         <a:srgbClr val="954F72"/>
       </a:folHlink>
     </a:clrScheme>
-    <a:fontScheme name="Office">
+    <a:fontScheme name="Tema de Office">
       <a:majorFont>
         <a:latin typeface="Calibri Light" panose="020F0302020204030204"/>
         <a:ea typeface=""/>
@@ -5176,23 +5659,6 @@
         <a:font script="Viet" typeface="Times New Roman"/>
         <a:font script="Uigh" typeface="Microsoft Uighur"/>
         <a:font script="Geor" typeface="Sylfaen"/>
-        <a:font script="Armn" typeface="Arial"/>
-        <a:font script="Bugi" typeface="Leelawadee UI"/>
-        <a:font script="Bopo" typeface="Microsoft JhengHei"/>
-        <a:font script="Java" typeface="Javanese Text"/>
-        <a:font script="Lisu" typeface="Segoe UI"/>
-        <a:font script="Mymr" typeface="Myanmar Text"/>
-        <a:font script="Nkoo" typeface="Ebrima"/>
-        <a:font script="Olck" typeface="Nirmala UI"/>
-        <a:font script="Osma" typeface="Ebrima"/>
-        <a:font script="Phag" typeface="Phagspa"/>
-        <a:font script="Syrn" typeface="Estrangelo Edessa"/>
-        <a:font script="Syrj" typeface="Estrangelo Edessa"/>
-        <a:font script="Syre" typeface="Estrangelo Edessa"/>
-        <a:font script="Sora" typeface="Nirmala UI"/>
-        <a:font script="Tale" typeface="Microsoft Tai Le"/>
-        <a:font script="Talu" typeface="Microsoft New Tai Lue"/>
-        <a:font script="Tfng" typeface="Ebrima"/>
       </a:majorFont>
       <a:minorFont>
         <a:latin typeface="Calibri" panose="020F0502020204030204"/>
@@ -5228,26 +5694,9 @@
         <a:font script="Viet" typeface="Arial"/>
         <a:font script="Uigh" typeface="Microsoft Uighur"/>
         <a:font script="Geor" typeface="Sylfaen"/>
-        <a:font script="Armn" typeface="Arial"/>
-        <a:font script="Bugi" typeface="Leelawadee UI"/>
-        <a:font script="Bopo" typeface="Microsoft JhengHei"/>
-        <a:font script="Java" typeface="Javanese Text"/>
-        <a:font script="Lisu" typeface="Segoe UI"/>
-        <a:font script="Mymr" typeface="Myanmar Text"/>
-        <a:font script="Nkoo" typeface="Ebrima"/>
-        <a:font script="Olck" typeface="Nirmala UI"/>
-        <a:font script="Osma" typeface="Ebrima"/>
-        <a:font script="Phag" typeface="Phagspa"/>
-        <a:font script="Syrn" typeface="Estrangelo Edessa"/>
-        <a:font script="Syrj" typeface="Estrangelo Edessa"/>
-        <a:font script="Syre" typeface="Estrangelo Edessa"/>
-        <a:font script="Sora" typeface="Nirmala UI"/>
-        <a:font script="Tale" typeface="Microsoft Tai Le"/>
-        <a:font script="Talu" typeface="Microsoft New Tai Lue"/>
-        <a:font script="Tfng" typeface="Ebrima"/>
       </a:minorFont>
     </a:fontScheme>
-    <a:fmtScheme name="Office">
+    <a:fmtScheme name="Tema de Office">
       <a:fillStyleLst>
         <a:solidFill>
           <a:schemeClr val="phClr"/>

</xml_diff>